<commit_message>
Guide to cloning the repo
</commit_message>
<xml_diff>
--- a/Presenters/Presentation.pptx
+++ b/Presenters/Presentation.pptx
@@ -9,6 +9,7 @@
     <p:sldId id="257" r:id="rId3"/>
     <p:sldId id="258" r:id="rId4"/>
     <p:sldId id="259" r:id="rId5"/>
+    <p:sldId id="260" r:id="rId6"/>
   </p:sldIdLst>
   <p:sldSz cx="12192000" cy="6858000"/>
   <p:notesSz cx="6858000" cy="9144000"/>
@@ -6211,6 +6212,119 @@
 </p:sld>
 </file>
 
+<file path=ppt/slides/slide5.xml><?xml version="1.0" encoding="utf-8"?>
+<p:sld xmlns:a="http://schemas.openxmlformats.org/drawingml/2006/main" xmlns:r="http://schemas.openxmlformats.org/officeDocument/2006/relationships" xmlns:p="http://schemas.openxmlformats.org/presentationml/2006/main">
+  <p:cSld>
+    <p:spTree>
+      <p:nvGrpSpPr>
+        <p:cNvPr id="1" name=""/>
+        <p:cNvGrpSpPr/>
+        <p:nvPr/>
+      </p:nvGrpSpPr>
+      <p:grpSpPr>
+        <a:xfrm>
+          <a:off x="0" y="0"/>
+          <a:ext cx="0" cy="0"/>
+          <a:chOff x="0" y="0"/>
+          <a:chExt cx="0" cy="0"/>
+        </a:xfrm>
+      </p:grpSpPr>
+      <p:sp>
+        <p:nvSpPr>
+          <p:cNvPr id="2" name="Title 1"/>
+          <p:cNvSpPr>
+            <a:spLocks noGrp="1"/>
+          </p:cNvSpPr>
+          <p:nvPr>
+            <p:ph type="title"/>
+          </p:nvPr>
+        </p:nvSpPr>
+        <p:spPr/>
+        <p:txBody>
+          <a:bodyPr/>
+          <a:lstStyle/>
+          <a:p>
+            <a:r>
+              <a:rPr lang="en-US" dirty="0" smtClean="0"/>
+              <a:t>Cloning the repo	</a:t>
+            </a:r>
+            <a:endParaRPr lang="en-US" dirty="0"/>
+          </a:p>
+        </p:txBody>
+      </p:sp>
+      <p:sp>
+        <p:nvSpPr>
+          <p:cNvPr id="3" name="Content Placeholder 2"/>
+          <p:cNvSpPr>
+            <a:spLocks noGrp="1"/>
+          </p:cNvSpPr>
+          <p:nvPr>
+            <p:ph idx="1"/>
+          </p:nvPr>
+        </p:nvSpPr>
+        <p:spPr/>
+        <p:txBody>
+          <a:bodyPr/>
+          <a:lstStyle/>
+          <a:p>
+            <a:r>
+              <a:rPr lang="en-US" dirty="0" smtClean="0"/>
+              <a:t>We have provided some starter code</a:t>
+            </a:r>
+          </a:p>
+          <a:p>
+            <a:r>
+              <a:rPr lang="en-US" sz="1600" dirty="0" err="1" smtClean="0">
+                <a:latin typeface="Lucida Sans Typewriter" panose="020B0509030504030204" pitchFamily="49" charset="0"/>
+              </a:rPr>
+              <a:t>git</a:t>
+            </a:r>
+            <a:r>
+              <a:rPr lang="en-US" sz="1600" dirty="0" smtClean="0">
+                <a:latin typeface="Lucida Sans Typewriter" panose="020B0509030504030204" pitchFamily="49" charset="0"/>
+              </a:rPr>
+              <a:t> clone https://github.com/zoldham/Redis-Intro </a:t>
+            </a:r>
+            <a:r>
+              <a:rPr lang="en-US" sz="1600" dirty="0" err="1" smtClean="0">
+                <a:latin typeface="Lucida Sans Typewriter" panose="020B0509030504030204" pitchFamily="49" charset="0"/>
+              </a:rPr>
+              <a:t>Redis</a:t>
+            </a:r>
+            <a:endParaRPr lang="en-US" sz="1600" dirty="0">
+              <a:latin typeface="Lucida Sans Typewriter" panose="020B0509030504030204" pitchFamily="49" charset="0"/>
+            </a:endParaRPr>
+          </a:p>
+          <a:p>
+            <a:r>
+              <a:rPr lang="en-US" dirty="0" smtClean="0"/>
+              <a:t> The starter code will be in </a:t>
+            </a:r>
+            <a:r>
+              <a:rPr lang="en-US" dirty="0" err="1" smtClean="0"/>
+              <a:t>Redis</a:t>
+            </a:r>
+            <a:r>
+              <a:rPr lang="en-US" dirty="0" smtClean="0"/>
+              <a:t>/Attendees</a:t>
+            </a:r>
+            <a:endParaRPr lang="en-US" dirty="0"/>
+          </a:p>
+        </p:txBody>
+      </p:sp>
+    </p:spTree>
+    <p:extLst>
+      <p:ext uri="{BB962C8B-B14F-4D97-AF65-F5344CB8AC3E}">
+        <p14:creationId xmlns:p14="http://schemas.microsoft.com/office/powerpoint/2010/main" val="4273352359"/>
+      </p:ext>
+    </p:extLst>
+  </p:cSld>
+  <p:clrMapOvr>
+    <a:masterClrMapping/>
+  </p:clrMapOvr>
+</p:sld>
+</file>
+
 <file path=ppt/theme/theme1.xml><?xml version="1.0" encoding="utf-8"?>
 <a:theme xmlns:a="http://schemas.openxmlformats.org/drawingml/2006/main" name="Celestial">
   <a:themeElements>

</xml_diff>

<commit_message>
Changes to markdown files, presentation progress
</commit_message>
<xml_diff>
--- a/Presenters/Presentation.pptx
+++ b/Presenters/Presentation.pptx
@@ -9,7 +9,9 @@
     <p:sldId id="257" r:id="rId3"/>
     <p:sldId id="258" r:id="rId4"/>
     <p:sldId id="259" r:id="rId5"/>
-    <p:sldId id="260" r:id="rId6"/>
+    <p:sldId id="262" r:id="rId6"/>
+    <p:sldId id="261" r:id="rId7"/>
+    <p:sldId id="260" r:id="rId8"/>
   </p:sldIdLst>
   <p:sldSz cx="12192000" cy="6858000"/>
   <p:notesSz cx="6858000" cy="9144000"/>
@@ -108,6 +110,11 @@
       </a:defRPr>
     </a:lvl9pPr>
   </p:defaultTextStyle>
+  <p:extLst>
+    <p:ext uri="{EFAFB233-063F-42B5-8137-9DF3F51BA10A}">
+      <p15:sldGuideLst xmlns:p15="http://schemas.microsoft.com/office/powerpoint/2012/main"/>
+    </p:ext>
+  </p:extLst>
 </p:presentation>
 </file>
 
@@ -340,7 +347,7 @@
           <a:p>
             <a:fld id="{F25FC3B1-12D0-4CE0-A1B2-F5FC9898A908}" type="datetimeFigureOut">
               <a:rPr lang="en-US" smtClean="0"/>
-              <a:t>6/10/2019</a:t>
+              <a:t>6/11/2019</a:t>
             </a:fld>
             <a:endParaRPr lang="en-US"/>
           </a:p>
@@ -674,7 +681,7 @@
           <a:p>
             <a:fld id="{F25FC3B1-12D0-4CE0-A1B2-F5FC9898A908}" type="datetimeFigureOut">
               <a:rPr lang="en-US" smtClean="0"/>
-              <a:t>6/10/2019</a:t>
+              <a:t>6/11/2019</a:t>
             </a:fld>
             <a:endParaRPr lang="en-US"/>
           </a:p>
@@ -952,7 +959,7 @@
           <a:p>
             <a:fld id="{F25FC3B1-12D0-4CE0-A1B2-F5FC9898A908}" type="datetimeFigureOut">
               <a:rPr lang="en-US" smtClean="0"/>
-              <a:t>6/10/2019</a:t>
+              <a:t>6/11/2019</a:t>
             </a:fld>
             <a:endParaRPr lang="en-US"/>
           </a:p>
@@ -1520,7 +1527,7 @@
           <a:p>
             <a:fld id="{F25FC3B1-12D0-4CE0-A1B2-F5FC9898A908}" type="datetimeFigureOut">
               <a:rPr lang="en-US" smtClean="0"/>
-              <a:t>6/10/2019</a:t>
+              <a:t>6/11/2019</a:t>
             </a:fld>
             <a:endParaRPr lang="en-US"/>
           </a:p>
@@ -1798,7 +1805,7 @@
           <a:p>
             <a:fld id="{F25FC3B1-12D0-4CE0-A1B2-F5FC9898A908}" type="datetimeFigureOut">
               <a:rPr lang="en-US" smtClean="0"/>
-              <a:t>6/10/2019</a:t>
+              <a:t>6/11/2019</a:t>
             </a:fld>
             <a:endParaRPr lang="en-US"/>
           </a:p>
@@ -2360,7 +2367,7 @@
           <a:p>
             <a:fld id="{F25FC3B1-12D0-4CE0-A1B2-F5FC9898A908}" type="datetimeFigureOut">
               <a:rPr lang="en-US" smtClean="0"/>
-              <a:t>6/10/2019</a:t>
+              <a:t>6/11/2019</a:t>
             </a:fld>
             <a:endParaRPr lang="en-US"/>
           </a:p>
@@ -2687,7 +2694,7 @@
           <a:p>
             <a:fld id="{F25FC3B1-12D0-4CE0-A1B2-F5FC9898A908}" type="datetimeFigureOut">
               <a:rPr lang="en-US" smtClean="0"/>
-              <a:t>6/10/2019</a:t>
+              <a:t>6/11/2019</a:t>
             </a:fld>
             <a:endParaRPr lang="en-US"/>
           </a:p>
@@ -2864,7 +2871,7 @@
           <a:p>
             <a:fld id="{F25FC3B1-12D0-4CE0-A1B2-F5FC9898A908}" type="datetimeFigureOut">
               <a:rPr lang="en-US" smtClean="0"/>
-              <a:t>6/10/2019</a:t>
+              <a:t>6/11/2019</a:t>
             </a:fld>
             <a:endParaRPr lang="en-US"/>
           </a:p>
@@ -3102,7 +3109,7 @@
           <a:p>
             <a:fld id="{F25FC3B1-12D0-4CE0-A1B2-F5FC9898A908}" type="datetimeFigureOut">
               <a:rPr lang="en-US" smtClean="0"/>
-              <a:t>6/10/2019</a:t>
+              <a:t>6/11/2019</a:t>
             </a:fld>
             <a:endParaRPr lang="en-US"/>
           </a:p>
@@ -3302,7 +3309,7 @@
           <a:p>
             <a:fld id="{F25FC3B1-12D0-4CE0-A1B2-F5FC9898A908}" type="datetimeFigureOut">
               <a:rPr lang="en-US" smtClean="0"/>
-              <a:t>6/10/2019</a:t>
+              <a:t>6/11/2019</a:t>
             </a:fld>
             <a:endParaRPr lang="en-US"/>
           </a:p>
@@ -3578,7 +3585,7 @@
           <a:p>
             <a:fld id="{F25FC3B1-12D0-4CE0-A1B2-F5FC9898A908}" type="datetimeFigureOut">
               <a:rPr lang="en-US" smtClean="0"/>
-              <a:t>6/10/2019</a:t>
+              <a:t>6/11/2019</a:t>
             </a:fld>
             <a:endParaRPr lang="en-US"/>
           </a:p>
@@ -3844,7 +3851,7 @@
           <a:p>
             <a:fld id="{F25FC3B1-12D0-4CE0-A1B2-F5FC9898A908}" type="datetimeFigureOut">
               <a:rPr lang="en-US" smtClean="0"/>
-              <a:t>6/10/2019</a:t>
+              <a:t>6/11/2019</a:t>
             </a:fld>
             <a:endParaRPr lang="en-US"/>
           </a:p>
@@ -4218,7 +4225,7 @@
           <a:p>
             <a:fld id="{F25FC3B1-12D0-4CE0-A1B2-F5FC9898A908}" type="datetimeFigureOut">
               <a:rPr lang="en-US" smtClean="0"/>
-              <a:t>6/10/2019</a:t>
+              <a:t>6/11/2019</a:t>
             </a:fld>
             <a:endParaRPr lang="en-US"/>
           </a:p>
@@ -4366,7 +4373,7 @@
           <a:p>
             <a:fld id="{F25FC3B1-12D0-4CE0-A1B2-F5FC9898A908}" type="datetimeFigureOut">
               <a:rPr lang="en-US" smtClean="0"/>
-              <a:t>6/10/2019</a:t>
+              <a:t>6/11/2019</a:t>
             </a:fld>
             <a:endParaRPr lang="en-US"/>
           </a:p>
@@ -4491,7 +4498,7 @@
           <a:p>
             <a:fld id="{F25FC3B1-12D0-4CE0-A1B2-F5FC9898A908}" type="datetimeFigureOut">
               <a:rPr lang="en-US" smtClean="0"/>
-              <a:t>6/10/2019</a:t>
+              <a:t>6/11/2019</a:t>
             </a:fld>
             <a:endParaRPr lang="en-US"/>
           </a:p>
@@ -4776,7 +4783,7 @@
           <a:p>
             <a:fld id="{F25FC3B1-12D0-4CE0-A1B2-F5FC9898A908}" type="datetimeFigureOut">
               <a:rPr lang="en-US" smtClean="0"/>
-              <a:t>6/10/2019</a:t>
+              <a:t>6/11/2019</a:t>
             </a:fld>
             <a:endParaRPr lang="en-US"/>
           </a:p>
@@ -5100,7 +5107,7 @@
           <a:p>
             <a:fld id="{F25FC3B1-12D0-4CE0-A1B2-F5FC9898A908}" type="datetimeFigureOut">
               <a:rPr lang="en-US" smtClean="0"/>
-              <a:t>6/10/2019</a:t>
+              <a:t>6/11/2019</a:t>
             </a:fld>
             <a:endParaRPr lang="en-US"/>
           </a:p>
@@ -5314,7 +5321,7 @@
           <a:p>
             <a:fld id="{F25FC3B1-12D0-4CE0-A1B2-F5FC9898A908}" type="datetimeFigureOut">
               <a:rPr lang="en-US" smtClean="0"/>
-              <a:t>6/10/2019</a:t>
+              <a:t>6/11/2019</a:t>
             </a:fld>
             <a:endParaRPr lang="en-US"/>
           </a:p>
@@ -5963,38 +5970,40 @@
         </p:nvSpPr>
         <p:spPr/>
         <p:txBody>
-          <a:bodyPr/>
-          <a:lstStyle/>
-          <a:p>
-            <a:r>
-              <a:rPr lang="en-US" dirty="0" smtClean="0"/>
+          <a:bodyPr>
+            <a:normAutofit/>
+          </a:bodyPr>
+          <a:lstStyle/>
+          <a:p>
+            <a:r>
+              <a:rPr lang="en-US" sz="2000" dirty="0" smtClean="0"/>
               <a:t>A highly configurable in-memory data structure store</a:t>
             </a:r>
           </a:p>
           <a:p>
             <a:r>
-              <a:rPr lang="en-US" dirty="0" smtClean="0"/>
+              <a:rPr lang="en-US" sz="2000" dirty="0" smtClean="0"/>
               <a:t>Used as a database, cache, or message broker</a:t>
             </a:r>
           </a:p>
           <a:p>
             <a:r>
-              <a:rPr lang="en-US" dirty="0" smtClean="0"/>
+              <a:rPr lang="en-US" sz="2000" dirty="0" smtClean="0"/>
               <a:t>Essentially a very fast key-value store</a:t>
             </a:r>
           </a:p>
           <a:p>
             <a:r>
-              <a:rPr lang="en-US" dirty="0" smtClean="0"/>
+              <a:rPr lang="en-US" sz="2000" dirty="0" smtClean="0"/>
               <a:t>Supported in most widely-used languages (C, C#, C++, Java, Python, Node.js, Scala, etc.)</a:t>
             </a:r>
           </a:p>
           <a:p>
             <a:r>
-              <a:rPr lang="en-US" dirty="0" smtClean="0"/>
+              <a:rPr lang="en-US" sz="2000" dirty="0" smtClean="0"/>
               <a:t>Supports many basic types and sets as values</a:t>
             </a:r>
-            <a:endParaRPr lang="en-US" dirty="0"/>
+            <a:endParaRPr lang="en-US" sz="2000" dirty="0"/>
           </a:p>
         </p:txBody>
       </p:sp>
@@ -6063,39 +6072,41 @@
         </p:nvSpPr>
         <p:spPr/>
         <p:txBody>
-          <a:bodyPr/>
-          <a:lstStyle/>
-          <a:p>
-            <a:r>
-              <a:rPr lang="en-US" dirty="0" smtClean="0"/>
+          <a:bodyPr>
+            <a:normAutofit/>
+          </a:bodyPr>
+          <a:lstStyle/>
+          <a:p>
+            <a:r>
+              <a:rPr lang="en-US" sz="2000" dirty="0" smtClean="0"/>
               <a:t>Caching of queries</a:t>
             </a:r>
           </a:p>
           <a:p>
             <a:r>
-              <a:rPr lang="en-US" dirty="0" smtClean="0"/>
+              <a:rPr lang="en-US" sz="2000" dirty="0" smtClean="0"/>
               <a:t>Performance improvements</a:t>
             </a:r>
           </a:p>
           <a:p>
             <a:pPr lvl="1"/>
             <a:r>
-              <a:rPr lang="en-US" dirty="0" smtClean="0"/>
+              <a:rPr lang="en-US" sz="2000" dirty="0" smtClean="0"/>
               <a:t>*Vague statistics here*</a:t>
             </a:r>
           </a:p>
           <a:p>
             <a:r>
-              <a:rPr lang="en-US" dirty="0" smtClean="0"/>
+              <a:rPr lang="en-US" sz="2000" dirty="0" smtClean="0"/>
               <a:t>One server/cluster can cache multiple types of information</a:t>
             </a:r>
           </a:p>
           <a:p>
             <a:r>
-              <a:rPr lang="en-US" dirty="0" smtClean="0"/>
+              <a:rPr lang="en-US" sz="2000" dirty="0" smtClean="0"/>
               <a:t>Easy to use</a:t>
             </a:r>
-            <a:endParaRPr lang="en-US" dirty="0"/>
+            <a:endParaRPr lang="en-US" sz="2000" dirty="0"/>
           </a:p>
         </p:txBody>
       </p:sp>
@@ -6164,38 +6175,40 @@
         </p:nvSpPr>
         <p:spPr/>
         <p:txBody>
-          <a:bodyPr/>
-          <a:lstStyle/>
-          <a:p>
-            <a:r>
-              <a:rPr lang="en-US" dirty="0" smtClean="0"/>
+          <a:bodyPr>
+            <a:normAutofit/>
+          </a:bodyPr>
+          <a:lstStyle/>
+          <a:p>
+            <a:r>
+              <a:rPr lang="en-US" sz="2000" dirty="0" smtClean="0"/>
               <a:t>Larger keys = Larger lookup times</a:t>
             </a:r>
           </a:p>
           <a:p>
             <a:r>
-              <a:rPr lang="en-US" dirty="0" smtClean="0"/>
+              <a:rPr lang="en-US" sz="2000" dirty="0" smtClean="0"/>
               <a:t>Memory-intensive: All data held in memory</a:t>
             </a:r>
           </a:p>
           <a:p>
             <a:r>
-              <a:rPr lang="en-US" dirty="0" smtClean="0"/>
+              <a:rPr lang="en-US" sz="2000" dirty="0" smtClean="0"/>
               <a:t>Keys must be strings or binary sequences</a:t>
             </a:r>
           </a:p>
           <a:p>
             <a:r>
-              <a:rPr lang="en-US" dirty="0" smtClean="0"/>
+              <a:rPr lang="en-US" sz="2000" dirty="0" smtClean="0"/>
               <a:t>Keys and values are limited to 512MB</a:t>
             </a:r>
           </a:p>
           <a:p>
             <a:r>
-              <a:rPr lang="en-US" dirty="0" smtClean="0"/>
+              <a:rPr lang="en-US" sz="2000" dirty="0" smtClean="0"/>
               <a:t>Less persistence than fully-fledged RDBMS</a:t>
             </a:r>
-            <a:endParaRPr lang="en-US" dirty="0"/>
+            <a:endParaRPr lang="en-US" sz="2000" dirty="0"/>
           </a:p>
         </p:txBody>
       </p:sp>
@@ -6246,6 +6259,377 @@
           <a:p>
             <a:r>
               <a:rPr lang="en-US" dirty="0" smtClean="0"/>
+              <a:t>How do I use it?</a:t>
+            </a:r>
+            <a:endParaRPr lang="en-US" dirty="0"/>
+          </a:p>
+        </p:txBody>
+      </p:sp>
+      <p:sp>
+        <p:nvSpPr>
+          <p:cNvPr id="3" name="Content Placeholder 2"/>
+          <p:cNvSpPr>
+            <a:spLocks noGrp="1"/>
+          </p:cNvSpPr>
+          <p:nvPr>
+            <p:ph sz="half" idx="1"/>
+          </p:nvPr>
+        </p:nvSpPr>
+        <p:spPr/>
+        <p:txBody>
+          <a:bodyPr>
+            <a:normAutofit/>
+          </a:bodyPr>
+          <a:lstStyle/>
+          <a:p>
+            <a:r>
+              <a:rPr lang="en-US" sz="2000" dirty="0" smtClean="0"/>
+              <a:t>Essentially a giant </a:t>
+            </a:r>
+            <a:r>
+              <a:rPr lang="en-US" sz="2000" dirty="0" err="1" smtClean="0"/>
+              <a:t>HashMap</a:t>
+            </a:r>
+            <a:endParaRPr lang="en-US" sz="2000" dirty="0" smtClean="0"/>
+          </a:p>
+          <a:p>
+            <a:pPr lvl="1"/>
+            <a:r>
+              <a:rPr lang="en-US" sz="2000" dirty="0" smtClean="0"/>
+              <a:t>Insert, remove, edit key-value pairs</a:t>
+            </a:r>
+          </a:p>
+          <a:p>
+            <a:r>
+              <a:rPr lang="en-US" sz="2000" dirty="0" smtClean="0"/>
+              <a:t>Clients offer easy API methods</a:t>
+            </a:r>
+          </a:p>
+          <a:p>
+            <a:r>
+              <a:rPr lang="en-US" sz="2000" dirty="0" smtClean="0"/>
+              <a:t>Most methods can be asynchronous or synchronous </a:t>
+            </a:r>
+          </a:p>
+          <a:p>
+            <a:r>
+              <a:rPr lang="en-US" sz="2000" dirty="0" smtClean="0"/>
+              <a:t>Use query as key, string representation of result as value</a:t>
+            </a:r>
+          </a:p>
+          <a:p>
+            <a:endParaRPr lang="en-US" sz="2000" dirty="0"/>
+          </a:p>
+        </p:txBody>
+      </p:sp>
+      <p:sp>
+        <p:nvSpPr>
+          <p:cNvPr id="4" name="Content Placeholder 3"/>
+          <p:cNvSpPr>
+            <a:spLocks noGrp="1"/>
+          </p:cNvSpPr>
+          <p:nvPr>
+            <p:ph sz="half" idx="2"/>
+          </p:nvPr>
+        </p:nvSpPr>
+        <p:spPr>
+          <a:xfrm>
+            <a:off x="5821895" y="2142067"/>
+            <a:ext cx="6273852" cy="3649133"/>
+          </a:xfrm>
+        </p:spPr>
+        <p:txBody>
+          <a:bodyPr>
+            <a:normAutofit/>
+          </a:bodyPr>
+          <a:lstStyle/>
+          <a:p>
+            <a:pPr marL="0" indent="0">
+              <a:buNone/>
+            </a:pPr>
+            <a:r>
+              <a:rPr lang="en-US" dirty="0" smtClean="0">
+                <a:latin typeface="Lucida Sans Typewriter" panose="020B0509030504030204" pitchFamily="49" charset="0"/>
+              </a:rPr>
+              <a:t>// C# example code</a:t>
+            </a:r>
+          </a:p>
+          <a:p>
+            <a:pPr marL="0" indent="0">
+              <a:buNone/>
+            </a:pPr>
+            <a:r>
+              <a:rPr lang="en-US" dirty="0" smtClean="0">
+                <a:latin typeface="Lucida Sans Typewriter" panose="020B0509030504030204" pitchFamily="49" charset="0"/>
+              </a:rPr>
+              <a:t>// </a:t>
+            </a:r>
+            <a:r>
+              <a:rPr lang="en-US" dirty="0" err="1" smtClean="0">
+                <a:latin typeface="Lucida Sans Typewriter" panose="020B0509030504030204" pitchFamily="49" charset="0"/>
+              </a:rPr>
+              <a:t>db</a:t>
+            </a:r>
+            <a:r>
+              <a:rPr lang="en-US" dirty="0" smtClean="0">
+                <a:latin typeface="Lucida Sans Typewriter" panose="020B0509030504030204" pitchFamily="49" charset="0"/>
+              </a:rPr>
+              <a:t> is connection to </a:t>
+            </a:r>
+            <a:r>
+              <a:rPr lang="en-US" dirty="0" err="1" smtClean="0">
+                <a:latin typeface="Lucida Sans Typewriter" panose="020B0509030504030204" pitchFamily="49" charset="0"/>
+              </a:rPr>
+              <a:t>Redis</a:t>
+            </a:r>
+            <a:endParaRPr lang="en-US" dirty="0" smtClean="0">
+              <a:latin typeface="Lucida Sans Typewriter" panose="020B0509030504030204" pitchFamily="49" charset="0"/>
+            </a:endParaRPr>
+          </a:p>
+          <a:p>
+            <a:pPr marL="0" indent="0">
+              <a:buNone/>
+            </a:pPr>
+            <a:r>
+              <a:rPr lang="en-US" dirty="0" smtClean="0">
+                <a:latin typeface="Lucida Sans Typewriter" panose="020B0509030504030204" pitchFamily="49" charset="0"/>
+              </a:rPr>
+              <a:t>string key = “Any string”;</a:t>
+            </a:r>
+          </a:p>
+          <a:p>
+            <a:pPr marL="0" indent="0">
+              <a:buNone/>
+            </a:pPr>
+            <a:r>
+              <a:rPr lang="en-US" dirty="0" smtClean="0">
+                <a:latin typeface="Lucida Sans Typewriter" panose="020B0509030504030204" pitchFamily="49" charset="0"/>
+              </a:rPr>
+              <a:t>string value = “Basic data type or set”;</a:t>
+            </a:r>
+          </a:p>
+          <a:p>
+            <a:pPr marL="0" indent="0">
+              <a:buNone/>
+            </a:pPr>
+            <a:r>
+              <a:rPr lang="en-US" dirty="0" err="1" smtClean="0">
+                <a:latin typeface="Lucida Sans Typewriter" panose="020B0509030504030204" pitchFamily="49" charset="0"/>
+              </a:rPr>
+              <a:t>db.StringSet</a:t>
+            </a:r>
+            <a:r>
+              <a:rPr lang="en-US" dirty="0" smtClean="0">
+                <a:latin typeface="Lucida Sans Typewriter" panose="020B0509030504030204" pitchFamily="49" charset="0"/>
+              </a:rPr>
+              <a:t>(key, value);</a:t>
+            </a:r>
+          </a:p>
+          <a:p>
+            <a:pPr marL="0" indent="0">
+              <a:buNone/>
+            </a:pPr>
+            <a:r>
+              <a:rPr lang="en-US" dirty="0" smtClean="0">
+                <a:latin typeface="Lucida Sans Typewriter" panose="020B0509030504030204" pitchFamily="49" charset="0"/>
+              </a:rPr>
+              <a:t>string </a:t>
+            </a:r>
+            <a:r>
+              <a:rPr lang="en-US" dirty="0" err="1" smtClean="0">
+                <a:latin typeface="Lucida Sans Typewriter" panose="020B0509030504030204" pitchFamily="49" charset="0"/>
+              </a:rPr>
+              <a:t>retVal</a:t>
+            </a:r>
+            <a:r>
+              <a:rPr lang="en-US" dirty="0" smtClean="0">
+                <a:latin typeface="Lucida Sans Typewriter" panose="020B0509030504030204" pitchFamily="49" charset="0"/>
+              </a:rPr>
+              <a:t> = </a:t>
+            </a:r>
+            <a:r>
+              <a:rPr lang="en-US" dirty="0" err="1" smtClean="0">
+                <a:latin typeface="Lucida Sans Typewriter" panose="020B0509030504030204" pitchFamily="49" charset="0"/>
+              </a:rPr>
+              <a:t>db.StringGet</a:t>
+            </a:r>
+            <a:r>
+              <a:rPr lang="en-US" dirty="0" smtClean="0">
+                <a:latin typeface="Lucida Sans Typewriter" panose="020B0509030504030204" pitchFamily="49" charset="0"/>
+              </a:rPr>
+              <a:t>(key);</a:t>
+            </a:r>
+          </a:p>
+          <a:p>
+            <a:pPr marL="0" indent="0">
+              <a:buNone/>
+            </a:pPr>
+            <a:r>
+              <a:rPr lang="en-US" dirty="0" smtClean="0">
+                <a:latin typeface="Lucida Sans Typewriter" panose="020B0509030504030204" pitchFamily="49" charset="0"/>
+              </a:rPr>
+              <a:t>bool </a:t>
+            </a:r>
+            <a:r>
+              <a:rPr lang="en-US" dirty="0" err="1" smtClean="0">
+                <a:latin typeface="Lucida Sans Typewriter" panose="020B0509030504030204" pitchFamily="49" charset="0"/>
+              </a:rPr>
+              <a:t>isSame</a:t>
+            </a:r>
+            <a:r>
+              <a:rPr lang="en-US" dirty="0" smtClean="0">
+                <a:latin typeface="Lucida Sans Typewriter" panose="020B0509030504030204" pitchFamily="49" charset="0"/>
+              </a:rPr>
+              <a:t> = </a:t>
+            </a:r>
+            <a:r>
+              <a:rPr lang="en-US" dirty="0" err="1" smtClean="0">
+                <a:latin typeface="Lucida Sans Typewriter" panose="020B0509030504030204" pitchFamily="49" charset="0"/>
+              </a:rPr>
+              <a:t>retVal.Equals</a:t>
+            </a:r>
+            <a:r>
+              <a:rPr lang="en-US" dirty="0" smtClean="0">
+                <a:latin typeface="Lucida Sans Typewriter" panose="020B0509030504030204" pitchFamily="49" charset="0"/>
+              </a:rPr>
+              <a:t>(value); // True</a:t>
+            </a:r>
+          </a:p>
+          <a:p>
+            <a:pPr marL="0" indent="0">
+              <a:buNone/>
+            </a:pPr>
+            <a:endParaRPr lang="en-US" dirty="0">
+              <a:latin typeface="Lucida Sans Typewriter" panose="020B0509030504030204" pitchFamily="49" charset="0"/>
+            </a:endParaRPr>
+          </a:p>
+        </p:txBody>
+      </p:sp>
+    </p:spTree>
+    <p:extLst>
+      <p:ext uri="{BB962C8B-B14F-4D97-AF65-F5344CB8AC3E}">
+        <p14:creationId xmlns:p14="http://schemas.microsoft.com/office/powerpoint/2010/main" val="651269242"/>
+      </p:ext>
+    </p:extLst>
+  </p:cSld>
+  <p:clrMapOvr>
+    <a:masterClrMapping/>
+  </p:clrMapOvr>
+</p:sld>
+</file>
+
+<file path=ppt/slides/slide6.xml><?xml version="1.0" encoding="utf-8"?>
+<p:sld xmlns:a="http://schemas.openxmlformats.org/drawingml/2006/main" xmlns:r="http://schemas.openxmlformats.org/officeDocument/2006/relationships" xmlns:p="http://schemas.openxmlformats.org/presentationml/2006/main">
+  <p:cSld>
+    <p:spTree>
+      <p:nvGrpSpPr>
+        <p:cNvPr id="1" name=""/>
+        <p:cNvGrpSpPr/>
+        <p:nvPr/>
+      </p:nvGrpSpPr>
+      <p:grpSpPr>
+        <a:xfrm>
+          <a:off x="0" y="0"/>
+          <a:ext cx="0" cy="0"/>
+          <a:chOff x="0" y="0"/>
+          <a:chExt cx="0" cy="0"/>
+        </a:xfrm>
+      </p:grpSpPr>
+      <p:sp>
+        <p:nvSpPr>
+          <p:cNvPr id="2" name="Title 1"/>
+          <p:cNvSpPr>
+            <a:spLocks noGrp="1"/>
+          </p:cNvSpPr>
+          <p:nvPr>
+            <p:ph type="title"/>
+          </p:nvPr>
+        </p:nvSpPr>
+        <p:spPr/>
+        <p:txBody>
+          <a:bodyPr/>
+          <a:lstStyle/>
+          <a:p>
+            <a:r>
+              <a:rPr lang="en-US" dirty="0" smtClean="0"/>
+              <a:t>Still not convinced?</a:t>
+            </a:r>
+            <a:endParaRPr lang="en-US" dirty="0"/>
+          </a:p>
+        </p:txBody>
+      </p:sp>
+      <p:sp>
+        <p:nvSpPr>
+          <p:cNvPr id="3" name="Content Placeholder 2"/>
+          <p:cNvSpPr>
+            <a:spLocks noGrp="1"/>
+          </p:cNvSpPr>
+          <p:nvPr>
+            <p:ph idx="1"/>
+          </p:nvPr>
+        </p:nvSpPr>
+        <p:spPr/>
+        <p:txBody>
+          <a:bodyPr>
+            <a:normAutofit/>
+          </a:bodyPr>
+          <a:lstStyle/>
+          <a:p>
+            <a:r>
+              <a:rPr lang="en-US" sz="2000" dirty="0" smtClean="0"/>
+              <a:t>*Concrete stats here*</a:t>
+            </a:r>
+            <a:endParaRPr lang="en-US" sz="2000" dirty="0"/>
+          </a:p>
+        </p:txBody>
+      </p:sp>
+    </p:spTree>
+    <p:extLst>
+      <p:ext uri="{BB962C8B-B14F-4D97-AF65-F5344CB8AC3E}">
+        <p14:creationId xmlns:p14="http://schemas.microsoft.com/office/powerpoint/2010/main" val="2334568054"/>
+      </p:ext>
+    </p:extLst>
+  </p:cSld>
+  <p:clrMapOvr>
+    <a:masterClrMapping/>
+  </p:clrMapOvr>
+</p:sld>
+</file>
+
+<file path=ppt/slides/slide7.xml><?xml version="1.0" encoding="utf-8"?>
+<p:sld xmlns:a="http://schemas.openxmlformats.org/drawingml/2006/main" xmlns:r="http://schemas.openxmlformats.org/officeDocument/2006/relationships" xmlns:p="http://schemas.openxmlformats.org/presentationml/2006/main">
+  <p:cSld>
+    <p:spTree>
+      <p:nvGrpSpPr>
+        <p:cNvPr id="1" name=""/>
+        <p:cNvGrpSpPr/>
+        <p:nvPr/>
+      </p:nvGrpSpPr>
+      <p:grpSpPr>
+        <a:xfrm>
+          <a:off x="0" y="0"/>
+          <a:ext cx="0" cy="0"/>
+          <a:chOff x="0" y="0"/>
+          <a:chExt cx="0" cy="0"/>
+        </a:xfrm>
+      </p:grpSpPr>
+      <p:sp>
+        <p:nvSpPr>
+          <p:cNvPr id="2" name="Title 1"/>
+          <p:cNvSpPr>
+            <a:spLocks noGrp="1"/>
+          </p:cNvSpPr>
+          <p:nvPr>
+            <p:ph type="title"/>
+          </p:nvPr>
+        </p:nvSpPr>
+        <p:spPr/>
+        <p:txBody>
+          <a:bodyPr/>
+          <a:lstStyle/>
+          <a:p>
+            <a:r>
+              <a:rPr lang="en-US" dirty="0" smtClean="0"/>
               <a:t>Cloning the repo	</a:t>
             </a:r>
             <a:endParaRPr lang="en-US" dirty="0"/>
@@ -6264,51 +6648,53 @@
         </p:nvSpPr>
         <p:spPr/>
         <p:txBody>
-          <a:bodyPr/>
-          <a:lstStyle/>
-          <a:p>
-            <a:r>
-              <a:rPr lang="en-US" dirty="0" smtClean="0"/>
+          <a:bodyPr>
+            <a:normAutofit/>
+          </a:bodyPr>
+          <a:lstStyle/>
+          <a:p>
+            <a:r>
+              <a:rPr lang="en-US" sz="2000" dirty="0" smtClean="0"/>
               <a:t>We have provided some starter code</a:t>
             </a:r>
           </a:p>
           <a:p>
             <a:r>
-              <a:rPr lang="en-US" sz="1600" dirty="0" err="1" smtClean="0">
+              <a:rPr lang="en-US" sz="2000" dirty="0" err="1" smtClean="0">
                 <a:latin typeface="Lucida Sans Typewriter" panose="020B0509030504030204" pitchFamily="49" charset="0"/>
               </a:rPr>
               <a:t>git</a:t>
             </a:r>
             <a:r>
-              <a:rPr lang="en-US" sz="1600" dirty="0" smtClean="0">
+              <a:rPr lang="en-US" sz="2000" dirty="0" smtClean="0">
                 <a:latin typeface="Lucida Sans Typewriter" panose="020B0509030504030204" pitchFamily="49" charset="0"/>
               </a:rPr>
               <a:t> clone https://github.com/zoldham/Redis-Intro </a:t>
             </a:r>
             <a:r>
-              <a:rPr lang="en-US" sz="1600" dirty="0" err="1" smtClean="0">
+              <a:rPr lang="en-US" sz="2000" dirty="0" err="1" smtClean="0">
                 <a:latin typeface="Lucida Sans Typewriter" panose="020B0509030504030204" pitchFamily="49" charset="0"/>
               </a:rPr>
               <a:t>Redis</a:t>
             </a:r>
-            <a:endParaRPr lang="en-US" sz="1600" dirty="0">
+            <a:endParaRPr lang="en-US" sz="2000" dirty="0">
               <a:latin typeface="Lucida Sans Typewriter" panose="020B0509030504030204" pitchFamily="49" charset="0"/>
             </a:endParaRPr>
           </a:p>
           <a:p>
             <a:r>
-              <a:rPr lang="en-US" dirty="0" smtClean="0"/>
+              <a:rPr lang="en-US" sz="2000" dirty="0" smtClean="0"/>
               <a:t> The starter code will be in </a:t>
             </a:r>
             <a:r>
-              <a:rPr lang="en-US" dirty="0" err="1" smtClean="0"/>
+              <a:rPr lang="en-US" sz="2000" dirty="0" err="1" smtClean="0"/>
               <a:t>Redis</a:t>
             </a:r>
             <a:r>
-              <a:rPr lang="en-US" dirty="0" smtClean="0"/>
+              <a:rPr lang="en-US" sz="2000" dirty="0" smtClean="0"/>
               <a:t>/Attendees</a:t>
             </a:r>
-            <a:endParaRPr lang="en-US" dirty="0"/>
+            <a:endParaRPr lang="en-US" sz="2000" dirty="0"/>
           </a:p>
         </p:txBody>
       </p:sp>

</xml_diff>

<commit_message>
minor presentation update, deleted temp files
</commit_message>
<xml_diff>
--- a/Presenters/Presentation.pptx
+++ b/Presenters/Presentation.pptx
@@ -199,7 +199,7 @@
           </a:lstStyle>
           <a:p>
             <a:r>
-              <a:rPr lang="en-US" smtClean="0"/>
+              <a:rPr lang="en-US"/>
               <a:t>Click to edit Master title style</a:t>
             </a:r>
             <a:endParaRPr lang="en-US" dirty="0"/>
@@ -318,7 +318,7 @@
           </a:lstStyle>
           <a:p>
             <a:r>
-              <a:rPr lang="en-US" smtClean="0"/>
+              <a:rPr lang="en-US"/>
               <a:t>Click to edit Master subtitle style</a:t>
             </a:r>
             <a:endParaRPr lang="en-US" dirty="0"/>
@@ -347,7 +347,7 @@
           <a:p>
             <a:fld id="{F25FC3B1-12D0-4CE0-A1B2-F5FC9898A908}" type="datetimeFigureOut">
               <a:rPr lang="en-US" smtClean="0"/>
-              <a:t>6/12/2019</a:t>
+              <a:t>6/14/2019</a:t>
             </a:fld>
             <a:endParaRPr lang="en-US"/>
           </a:p>
@@ -492,7 +492,7 @@
           </a:lstStyle>
           <a:p>
             <a:r>
-              <a:rPr lang="en-US" smtClean="0"/>
+              <a:rPr lang="en-US"/>
               <a:t>Click to edit Master title style</a:t>
             </a:r>
             <a:endParaRPr lang="en-US" dirty="0"/>
@@ -590,7 +590,7 @@
           </a:lstStyle>
           <a:p>
             <a:r>
-              <a:rPr lang="en-US" smtClean="0"/>
+              <a:rPr lang="en-US"/>
               <a:t>Click icon to add picture</a:t>
             </a:r>
             <a:endParaRPr lang="en-US" dirty="0"/>
@@ -658,7 +658,7 @@
           <a:p>
             <a:pPr lvl="0"/>
             <a:r>
-              <a:rPr lang="en-US" smtClean="0"/>
+              <a:rPr lang="en-US"/>
               <a:t>Edit Master text styles</a:t>
             </a:r>
           </a:p>
@@ -681,7 +681,7 @@
           <a:p>
             <a:fld id="{F25FC3B1-12D0-4CE0-A1B2-F5FC9898A908}" type="datetimeFigureOut">
               <a:rPr lang="en-US" smtClean="0"/>
-              <a:t>6/12/2019</a:t>
+              <a:t>6/14/2019</a:t>
             </a:fld>
             <a:endParaRPr lang="en-US"/>
           </a:p>
@@ -816,7 +816,7 @@
           </a:lstStyle>
           <a:p>
             <a:r>
-              <a:rPr lang="en-US" smtClean="0"/>
+              <a:rPr lang="en-US"/>
               <a:t>Click to edit Master title style</a:t>
             </a:r>
             <a:endParaRPr lang="en-US" dirty="0"/>
@@ -936,7 +936,7 @@
           <a:p>
             <a:pPr lvl="0"/>
             <a:r>
-              <a:rPr lang="en-US" smtClean="0"/>
+              <a:rPr lang="en-US"/>
               <a:t>Edit Master text styles</a:t>
             </a:r>
           </a:p>
@@ -959,7 +959,7 @@
           <a:p>
             <a:fld id="{F25FC3B1-12D0-4CE0-A1B2-F5FC9898A908}" type="datetimeFigureOut">
               <a:rPr lang="en-US" smtClean="0"/>
-              <a:t>6/12/2019</a:t>
+              <a:t>6/14/2019</a:t>
             </a:fld>
             <a:endParaRPr lang="en-US"/>
           </a:p>
@@ -1330,7 +1330,7 @@
           </a:lstStyle>
           <a:p>
             <a:r>
-              <a:rPr lang="en-US" smtClean="0"/>
+              <a:rPr lang="en-US"/>
               <a:t>Click to edit Master title style</a:t>
             </a:r>
             <a:endParaRPr lang="en-US" dirty="0"/>
@@ -1385,7 +1385,7 @@
           <a:p>
             <a:pPr lvl="0"/>
             <a:r>
-              <a:rPr lang="en-US" smtClean="0"/>
+              <a:rPr lang="en-US"/>
               <a:t>Edit Master text styles</a:t>
             </a:r>
           </a:p>
@@ -1504,7 +1504,7 @@
           <a:p>
             <a:pPr lvl="0"/>
             <a:r>
-              <a:rPr lang="en-US" smtClean="0"/>
+              <a:rPr lang="en-US"/>
               <a:t>Edit Master text styles</a:t>
             </a:r>
           </a:p>
@@ -1527,7 +1527,7 @@
           <a:p>
             <a:fld id="{F25FC3B1-12D0-4CE0-A1B2-F5FC9898A908}" type="datetimeFigureOut">
               <a:rPr lang="en-US" smtClean="0"/>
-              <a:t>6/12/2019</a:t>
+              <a:t>6/14/2019</a:t>
             </a:fld>
             <a:endParaRPr lang="en-US"/>
           </a:p>
@@ -1662,7 +1662,7 @@
           </a:lstStyle>
           <a:p>
             <a:r>
-              <a:rPr lang="en-US" smtClean="0"/>
+              <a:rPr lang="en-US"/>
               <a:t>Click to edit Master title style</a:t>
             </a:r>
             <a:endParaRPr lang="en-US" dirty="0"/>
@@ -1782,7 +1782,7 @@
           <a:p>
             <a:pPr lvl="0"/>
             <a:r>
-              <a:rPr lang="en-US" smtClean="0"/>
+              <a:rPr lang="en-US"/>
               <a:t>Edit Master text styles</a:t>
             </a:r>
           </a:p>
@@ -1805,7 +1805,7 @@
           <a:p>
             <a:fld id="{F25FC3B1-12D0-4CE0-A1B2-F5FC9898A908}" type="datetimeFigureOut">
               <a:rPr lang="en-US" smtClean="0"/>
-              <a:t>6/12/2019</a:t>
+              <a:t>6/14/2019</a:t>
             </a:fld>
             <a:endParaRPr lang="en-US"/>
           </a:p>
@@ -2176,7 +2176,7 @@
           </a:lstStyle>
           <a:p>
             <a:r>
-              <a:rPr lang="en-US" smtClean="0"/>
+              <a:rPr lang="en-US"/>
               <a:t>Click to edit Master title style</a:t>
             </a:r>
             <a:endParaRPr lang="en-US" dirty="0"/>
@@ -2225,7 +2225,7 @@
               <a:buNone/>
             </a:pPr>
             <a:r>
-              <a:rPr lang="en-US" smtClean="0"/>
+              <a:rPr lang="en-US"/>
               <a:t>Edit Master text styles</a:t>
             </a:r>
           </a:p>
@@ -2344,7 +2344,7 @@
           <a:p>
             <a:pPr lvl="0"/>
             <a:r>
-              <a:rPr lang="en-US" smtClean="0"/>
+              <a:rPr lang="en-US"/>
               <a:t>Edit Master text styles</a:t>
             </a:r>
           </a:p>
@@ -2367,7 +2367,7 @@
           <a:p>
             <a:fld id="{F25FC3B1-12D0-4CE0-A1B2-F5FC9898A908}" type="datetimeFigureOut">
               <a:rPr lang="en-US" smtClean="0"/>
-              <a:t>6/12/2019</a:t>
+              <a:t>6/14/2019</a:t>
             </a:fld>
             <a:endParaRPr lang="en-US"/>
           </a:p>
@@ -2503,7 +2503,7 @@
           <a:p>
             <a:pPr marL="0" lvl="0"/>
             <a:r>
-              <a:rPr lang="en-US" smtClean="0"/>
+              <a:rPr lang="en-US"/>
               <a:t>Click to edit Master title style</a:t>
             </a:r>
             <a:endParaRPr lang="en-US" dirty="0"/>
@@ -2552,7 +2552,7 @@
               <a:buNone/>
             </a:pPr>
             <a:r>
-              <a:rPr lang="en-US" smtClean="0"/>
+              <a:rPr lang="en-US"/>
               <a:t>Edit Master text styles</a:t>
             </a:r>
           </a:p>
@@ -2671,7 +2671,7 @@
           <a:p>
             <a:pPr lvl="0"/>
             <a:r>
-              <a:rPr lang="en-US" smtClean="0"/>
+              <a:rPr lang="en-US"/>
               <a:t>Edit Master text styles</a:t>
             </a:r>
           </a:p>
@@ -2694,7 +2694,7 @@
           <a:p>
             <a:fld id="{F25FC3B1-12D0-4CE0-A1B2-F5FC9898A908}" type="datetimeFigureOut">
               <a:rPr lang="en-US" smtClean="0"/>
-              <a:t>6/12/2019</a:t>
+              <a:t>6/14/2019</a:t>
             </a:fld>
             <a:endParaRPr lang="en-US"/>
           </a:p>
@@ -2819,35 +2819,35 @@
           <a:p>
             <a:pPr lvl="0"/>
             <a:r>
-              <a:rPr lang="en-US" smtClean="0"/>
+              <a:rPr lang="en-US"/>
               <a:t>Edit Master text styles</a:t>
             </a:r>
           </a:p>
           <a:p>
             <a:pPr lvl="1"/>
             <a:r>
-              <a:rPr lang="en-US" smtClean="0"/>
+              <a:rPr lang="en-US"/>
               <a:t>Second level</a:t>
             </a:r>
           </a:p>
           <a:p>
             <a:pPr lvl="2"/>
             <a:r>
-              <a:rPr lang="en-US" smtClean="0"/>
+              <a:rPr lang="en-US"/>
               <a:t>Third level</a:t>
             </a:r>
           </a:p>
           <a:p>
             <a:pPr lvl="3"/>
             <a:r>
-              <a:rPr lang="en-US" smtClean="0"/>
+              <a:rPr lang="en-US"/>
               <a:t>Fourth level</a:t>
             </a:r>
           </a:p>
           <a:p>
             <a:pPr lvl="4"/>
             <a:r>
-              <a:rPr lang="en-US" smtClean="0"/>
+              <a:rPr lang="en-US"/>
               <a:t>Fifth level</a:t>
             </a:r>
             <a:endParaRPr lang="en-US" dirty="0"/>
@@ -2871,7 +2871,7 @@
           <a:p>
             <a:fld id="{F25FC3B1-12D0-4CE0-A1B2-F5FC9898A908}" type="datetimeFigureOut">
               <a:rPr lang="en-US" smtClean="0"/>
-              <a:t>6/12/2019</a:t>
+              <a:t>6/14/2019</a:t>
             </a:fld>
             <a:endParaRPr lang="en-US"/>
           </a:p>
@@ -2940,7 +2940,7 @@
           <a:lstStyle/>
           <a:p>
             <a:r>
-              <a:rPr lang="en-US" smtClean="0"/>
+              <a:rPr lang="en-US"/>
               <a:t>Click to edit Master title style</a:t>
             </a:r>
             <a:endParaRPr lang="en-US" dirty="0"/>
@@ -3028,7 +3028,7 @@
           <a:lstStyle/>
           <a:p>
             <a:r>
-              <a:rPr lang="en-US" smtClean="0"/>
+              <a:rPr lang="en-US"/>
               <a:t>Click to edit Master title style</a:t>
             </a:r>
             <a:endParaRPr lang="en-US" dirty="0"/>
@@ -3057,35 +3057,35 @@
           <a:p>
             <a:pPr lvl="0"/>
             <a:r>
-              <a:rPr lang="en-US" smtClean="0"/>
+              <a:rPr lang="en-US"/>
               <a:t>Edit Master text styles</a:t>
             </a:r>
           </a:p>
           <a:p>
             <a:pPr lvl="1"/>
             <a:r>
-              <a:rPr lang="en-US" smtClean="0"/>
+              <a:rPr lang="en-US"/>
               <a:t>Second level</a:t>
             </a:r>
           </a:p>
           <a:p>
             <a:pPr lvl="2"/>
             <a:r>
-              <a:rPr lang="en-US" smtClean="0"/>
+              <a:rPr lang="en-US"/>
               <a:t>Third level</a:t>
             </a:r>
           </a:p>
           <a:p>
             <a:pPr lvl="3"/>
             <a:r>
-              <a:rPr lang="en-US" smtClean="0"/>
+              <a:rPr lang="en-US"/>
               <a:t>Fourth level</a:t>
             </a:r>
           </a:p>
           <a:p>
             <a:pPr lvl="4"/>
             <a:r>
-              <a:rPr lang="en-US" smtClean="0"/>
+              <a:rPr lang="en-US"/>
               <a:t>Fifth level</a:t>
             </a:r>
             <a:endParaRPr lang="en-US" dirty="0"/>
@@ -3109,7 +3109,7 @@
           <a:p>
             <a:fld id="{F25FC3B1-12D0-4CE0-A1B2-F5FC9898A908}" type="datetimeFigureOut">
               <a:rPr lang="en-US" smtClean="0"/>
-              <a:t>6/12/2019</a:t>
+              <a:t>6/14/2019</a:t>
             </a:fld>
             <a:endParaRPr lang="en-US"/>
           </a:p>
@@ -3233,7 +3233,7 @@
           <a:lstStyle/>
           <a:p>
             <a:r>
-              <a:rPr lang="en-US" smtClean="0"/>
+              <a:rPr lang="en-US"/>
               <a:t>Click to edit Master title style</a:t>
             </a:r>
             <a:endParaRPr lang="en-US" dirty="0"/>
@@ -3257,35 +3257,35 @@
           <a:p>
             <a:pPr lvl="0"/>
             <a:r>
-              <a:rPr lang="en-US" smtClean="0"/>
+              <a:rPr lang="en-US"/>
               <a:t>Edit Master text styles</a:t>
             </a:r>
           </a:p>
           <a:p>
             <a:pPr lvl="1"/>
             <a:r>
-              <a:rPr lang="en-US" smtClean="0"/>
+              <a:rPr lang="en-US"/>
               <a:t>Second level</a:t>
             </a:r>
           </a:p>
           <a:p>
             <a:pPr lvl="2"/>
             <a:r>
-              <a:rPr lang="en-US" smtClean="0"/>
+              <a:rPr lang="en-US"/>
               <a:t>Third level</a:t>
             </a:r>
           </a:p>
           <a:p>
             <a:pPr lvl="3"/>
             <a:r>
-              <a:rPr lang="en-US" smtClean="0"/>
+              <a:rPr lang="en-US"/>
               <a:t>Fourth level</a:t>
             </a:r>
           </a:p>
           <a:p>
             <a:pPr lvl="4"/>
             <a:r>
-              <a:rPr lang="en-US" smtClean="0"/>
+              <a:rPr lang="en-US"/>
               <a:t>Fifth level</a:t>
             </a:r>
             <a:endParaRPr lang="en-US" dirty="0"/>
@@ -3309,7 +3309,7 @@
           <a:p>
             <a:fld id="{F25FC3B1-12D0-4CE0-A1B2-F5FC9898A908}" type="datetimeFigureOut">
               <a:rPr lang="en-US" smtClean="0"/>
-              <a:t>6/12/2019</a:t>
+              <a:t>6/14/2019</a:t>
             </a:fld>
             <a:endParaRPr lang="en-US"/>
           </a:p>
@@ -3442,7 +3442,7 @@
           </a:lstStyle>
           <a:p>
             <a:r>
-              <a:rPr lang="en-US" smtClean="0"/>
+              <a:rPr lang="en-US"/>
               <a:t>Click to edit Master title style</a:t>
             </a:r>
             <a:endParaRPr lang="en-US" dirty="0"/>
@@ -3562,7 +3562,7 @@
           <a:p>
             <a:pPr lvl="0"/>
             <a:r>
-              <a:rPr lang="en-US" smtClean="0"/>
+              <a:rPr lang="en-US"/>
               <a:t>Edit Master text styles</a:t>
             </a:r>
           </a:p>
@@ -3585,7 +3585,7 @@
           <a:p>
             <a:fld id="{F25FC3B1-12D0-4CE0-A1B2-F5FC9898A908}" type="datetimeFigureOut">
               <a:rPr lang="en-US" smtClean="0"/>
-              <a:t>6/12/2019</a:t>
+              <a:t>6/14/2019</a:t>
             </a:fld>
             <a:endParaRPr lang="en-US"/>
           </a:p>
@@ -3709,7 +3709,7 @@
           <a:lstStyle/>
           <a:p>
             <a:r>
-              <a:rPr lang="en-US" smtClean="0"/>
+              <a:rPr lang="en-US"/>
               <a:t>Click to edit Master title style</a:t>
             </a:r>
             <a:endParaRPr lang="en-US" dirty="0"/>
@@ -3740,35 +3740,35 @@
           <a:p>
             <a:pPr lvl="0"/>
             <a:r>
-              <a:rPr lang="en-US" smtClean="0"/>
+              <a:rPr lang="en-US"/>
               <a:t>Edit Master text styles</a:t>
             </a:r>
           </a:p>
           <a:p>
             <a:pPr lvl="1"/>
             <a:r>
-              <a:rPr lang="en-US" smtClean="0"/>
+              <a:rPr lang="en-US"/>
               <a:t>Second level</a:t>
             </a:r>
           </a:p>
           <a:p>
             <a:pPr lvl="2"/>
             <a:r>
-              <a:rPr lang="en-US" smtClean="0"/>
+              <a:rPr lang="en-US"/>
               <a:t>Third level</a:t>
             </a:r>
           </a:p>
           <a:p>
             <a:pPr lvl="3"/>
             <a:r>
-              <a:rPr lang="en-US" smtClean="0"/>
+              <a:rPr lang="en-US"/>
               <a:t>Fourth level</a:t>
             </a:r>
           </a:p>
           <a:p>
             <a:pPr lvl="4"/>
             <a:r>
-              <a:rPr lang="en-US" smtClean="0"/>
+              <a:rPr lang="en-US"/>
               <a:t>Fifth level</a:t>
             </a:r>
             <a:endParaRPr lang="en-US" dirty="0"/>
@@ -3799,35 +3799,35 @@
           <a:p>
             <a:pPr lvl="0"/>
             <a:r>
-              <a:rPr lang="en-US" smtClean="0"/>
+              <a:rPr lang="en-US"/>
               <a:t>Edit Master text styles</a:t>
             </a:r>
           </a:p>
           <a:p>
             <a:pPr lvl="1"/>
             <a:r>
-              <a:rPr lang="en-US" smtClean="0"/>
+              <a:rPr lang="en-US"/>
               <a:t>Second level</a:t>
             </a:r>
           </a:p>
           <a:p>
             <a:pPr lvl="2"/>
             <a:r>
-              <a:rPr lang="en-US" smtClean="0"/>
+              <a:rPr lang="en-US"/>
               <a:t>Third level</a:t>
             </a:r>
           </a:p>
           <a:p>
             <a:pPr lvl="3"/>
             <a:r>
-              <a:rPr lang="en-US" smtClean="0"/>
+              <a:rPr lang="en-US"/>
               <a:t>Fourth level</a:t>
             </a:r>
           </a:p>
           <a:p>
             <a:pPr lvl="4"/>
             <a:r>
-              <a:rPr lang="en-US" smtClean="0"/>
+              <a:rPr lang="en-US"/>
               <a:t>Fifth level</a:t>
             </a:r>
             <a:endParaRPr lang="en-US" dirty="0"/>
@@ -3851,7 +3851,7 @@
           <a:p>
             <a:fld id="{F25FC3B1-12D0-4CE0-A1B2-F5FC9898A908}" type="datetimeFigureOut">
               <a:rPr lang="en-US" smtClean="0"/>
-              <a:t>6/12/2019</a:t>
+              <a:t>6/14/2019</a:t>
             </a:fld>
             <a:endParaRPr lang="en-US"/>
           </a:p>
@@ -3949,7 +3949,7 @@
           </a:lstStyle>
           <a:p>
             <a:r>
-              <a:rPr lang="en-US" smtClean="0"/>
+              <a:rPr lang="en-US"/>
               <a:t>Click to edit Master title style</a:t>
             </a:r>
             <a:endParaRPr lang="en-US" dirty="0"/>
@@ -4017,7 +4017,7 @@
           <a:p>
             <a:pPr lvl="0"/>
             <a:r>
-              <a:rPr lang="en-US" smtClean="0"/>
+              <a:rPr lang="en-US"/>
               <a:t>Edit Master text styles</a:t>
             </a:r>
           </a:p>
@@ -4047,35 +4047,35 @@
           <a:p>
             <a:pPr lvl="0"/>
             <a:r>
-              <a:rPr lang="en-US" smtClean="0"/>
+              <a:rPr lang="en-US"/>
               <a:t>Edit Master text styles</a:t>
             </a:r>
           </a:p>
           <a:p>
             <a:pPr lvl="1"/>
             <a:r>
-              <a:rPr lang="en-US" smtClean="0"/>
+              <a:rPr lang="en-US"/>
               <a:t>Second level</a:t>
             </a:r>
           </a:p>
           <a:p>
             <a:pPr lvl="2"/>
             <a:r>
-              <a:rPr lang="en-US" smtClean="0"/>
+              <a:rPr lang="en-US"/>
               <a:t>Third level</a:t>
             </a:r>
           </a:p>
           <a:p>
             <a:pPr lvl="3"/>
             <a:r>
-              <a:rPr lang="en-US" smtClean="0"/>
+              <a:rPr lang="en-US"/>
               <a:t>Fourth level</a:t>
             </a:r>
           </a:p>
           <a:p>
             <a:pPr lvl="4"/>
             <a:r>
-              <a:rPr lang="en-US" smtClean="0"/>
+              <a:rPr lang="en-US"/>
               <a:t>Fifth level</a:t>
             </a:r>
             <a:endParaRPr lang="en-US" dirty="0"/>
@@ -4143,7 +4143,7 @@
           <a:p>
             <a:pPr lvl="0"/>
             <a:r>
-              <a:rPr lang="en-US" smtClean="0"/>
+              <a:rPr lang="en-US"/>
               <a:t>Edit Master text styles</a:t>
             </a:r>
           </a:p>
@@ -4173,35 +4173,35 @@
           <a:p>
             <a:pPr lvl="0"/>
             <a:r>
-              <a:rPr lang="en-US" smtClean="0"/>
+              <a:rPr lang="en-US"/>
               <a:t>Edit Master text styles</a:t>
             </a:r>
           </a:p>
           <a:p>
             <a:pPr lvl="1"/>
             <a:r>
-              <a:rPr lang="en-US" smtClean="0"/>
+              <a:rPr lang="en-US"/>
               <a:t>Second level</a:t>
             </a:r>
           </a:p>
           <a:p>
             <a:pPr lvl="2"/>
             <a:r>
-              <a:rPr lang="en-US" smtClean="0"/>
+              <a:rPr lang="en-US"/>
               <a:t>Third level</a:t>
             </a:r>
           </a:p>
           <a:p>
             <a:pPr lvl="3"/>
             <a:r>
-              <a:rPr lang="en-US" smtClean="0"/>
+              <a:rPr lang="en-US"/>
               <a:t>Fourth level</a:t>
             </a:r>
           </a:p>
           <a:p>
             <a:pPr lvl="4"/>
             <a:r>
-              <a:rPr lang="en-US" smtClean="0"/>
+              <a:rPr lang="en-US"/>
               <a:t>Fifth level</a:t>
             </a:r>
             <a:endParaRPr lang="en-US" dirty="0"/>
@@ -4225,7 +4225,7 @@
           <a:p>
             <a:fld id="{F25FC3B1-12D0-4CE0-A1B2-F5FC9898A908}" type="datetimeFigureOut">
               <a:rPr lang="en-US" smtClean="0"/>
-              <a:t>6/12/2019</a:t>
+              <a:t>6/14/2019</a:t>
             </a:fld>
             <a:endParaRPr lang="en-US"/>
           </a:p>
@@ -4349,7 +4349,7 @@
           <a:lstStyle/>
           <a:p>
             <a:r>
-              <a:rPr lang="en-US" smtClean="0"/>
+              <a:rPr lang="en-US"/>
               <a:t>Click to edit Master title style</a:t>
             </a:r>
             <a:endParaRPr lang="en-US" dirty="0"/>
@@ -4373,7 +4373,7 @@
           <a:p>
             <a:fld id="{F25FC3B1-12D0-4CE0-A1B2-F5FC9898A908}" type="datetimeFigureOut">
               <a:rPr lang="en-US" smtClean="0"/>
-              <a:t>6/12/2019</a:t>
+              <a:t>6/14/2019</a:t>
             </a:fld>
             <a:endParaRPr lang="en-US"/>
           </a:p>
@@ -4498,7 +4498,7 @@
           <a:p>
             <a:fld id="{F25FC3B1-12D0-4CE0-A1B2-F5FC9898A908}" type="datetimeFigureOut">
               <a:rPr lang="en-US" smtClean="0"/>
-              <a:t>6/12/2019</a:t>
+              <a:t>6/14/2019</a:t>
             </a:fld>
             <a:endParaRPr lang="en-US"/>
           </a:p>
@@ -4633,7 +4633,7 @@
           </a:lstStyle>
           <a:p>
             <a:r>
-              <a:rPr lang="en-US" smtClean="0"/>
+              <a:rPr lang="en-US"/>
               <a:t>Click to edit Master title style</a:t>
             </a:r>
             <a:endParaRPr lang="en-US" dirty="0"/>
@@ -4664,35 +4664,35 @@
           <a:p>
             <a:pPr lvl="0"/>
             <a:r>
-              <a:rPr lang="en-US" smtClean="0"/>
+              <a:rPr lang="en-US"/>
               <a:t>Edit Master text styles</a:t>
             </a:r>
           </a:p>
           <a:p>
             <a:pPr lvl="1"/>
             <a:r>
-              <a:rPr lang="en-US" smtClean="0"/>
+              <a:rPr lang="en-US"/>
               <a:t>Second level</a:t>
             </a:r>
           </a:p>
           <a:p>
             <a:pPr lvl="2"/>
             <a:r>
-              <a:rPr lang="en-US" smtClean="0"/>
+              <a:rPr lang="en-US"/>
               <a:t>Third level</a:t>
             </a:r>
           </a:p>
           <a:p>
             <a:pPr lvl="3"/>
             <a:r>
-              <a:rPr lang="en-US" smtClean="0"/>
+              <a:rPr lang="en-US"/>
               <a:t>Fourth level</a:t>
             </a:r>
           </a:p>
           <a:p>
             <a:pPr lvl="4"/>
             <a:r>
-              <a:rPr lang="en-US" smtClean="0"/>
+              <a:rPr lang="en-US"/>
               <a:t>Fifth level</a:t>
             </a:r>
             <a:endParaRPr lang="en-US" dirty="0"/>
@@ -4760,7 +4760,7 @@
           <a:p>
             <a:pPr lvl="0"/>
             <a:r>
-              <a:rPr lang="en-US" smtClean="0"/>
+              <a:rPr lang="en-US"/>
               <a:t>Edit Master text styles</a:t>
             </a:r>
           </a:p>
@@ -4783,7 +4783,7 @@
           <a:p>
             <a:fld id="{F25FC3B1-12D0-4CE0-A1B2-F5FC9898A908}" type="datetimeFigureOut">
               <a:rPr lang="en-US" smtClean="0"/>
-              <a:t>6/12/2019</a:t>
+              <a:t>6/14/2019</a:t>
             </a:fld>
             <a:endParaRPr lang="en-US"/>
           </a:p>
@@ -4918,7 +4918,7 @@
           </a:lstStyle>
           <a:p>
             <a:r>
-              <a:rPr lang="en-US" smtClean="0"/>
+              <a:rPr lang="en-US"/>
               <a:t>Click to edit Master title style</a:t>
             </a:r>
             <a:endParaRPr lang="en-US" dirty="0"/>
@@ -5016,7 +5016,7 @@
           </a:lstStyle>
           <a:p>
             <a:r>
-              <a:rPr lang="en-US" smtClean="0"/>
+              <a:rPr lang="en-US"/>
               <a:t>Click icon to add picture</a:t>
             </a:r>
             <a:endParaRPr lang="en-US" dirty="0"/>
@@ -5084,7 +5084,7 @@
           <a:p>
             <a:pPr lvl="0"/>
             <a:r>
-              <a:rPr lang="en-US" smtClean="0"/>
+              <a:rPr lang="en-US"/>
               <a:t>Edit Master text styles</a:t>
             </a:r>
           </a:p>
@@ -5107,7 +5107,7 @@
           <a:p>
             <a:fld id="{F25FC3B1-12D0-4CE0-A1B2-F5FC9898A908}" type="datetimeFigureOut">
               <a:rPr lang="en-US" smtClean="0"/>
-              <a:t>6/12/2019</a:t>
+              <a:t>6/14/2019</a:t>
             </a:fld>
             <a:endParaRPr lang="en-US"/>
           </a:p>
@@ -5217,7 +5217,7 @@
           <a:lstStyle/>
           <a:p>
             <a:r>
-              <a:rPr lang="en-US" smtClean="0"/>
+              <a:rPr lang="en-US"/>
               <a:t>Click to edit Master title style</a:t>
             </a:r>
             <a:endParaRPr lang="en-US" dirty="0"/>
@@ -5251,35 +5251,35 @@
           <a:p>
             <a:pPr lvl="0"/>
             <a:r>
-              <a:rPr lang="en-US" smtClean="0"/>
+              <a:rPr lang="en-US"/>
               <a:t>Edit Master text styles</a:t>
             </a:r>
           </a:p>
           <a:p>
             <a:pPr lvl="1"/>
             <a:r>
-              <a:rPr lang="en-US" smtClean="0"/>
+              <a:rPr lang="en-US"/>
               <a:t>Second level</a:t>
             </a:r>
           </a:p>
           <a:p>
             <a:pPr lvl="2"/>
             <a:r>
-              <a:rPr lang="en-US" smtClean="0"/>
+              <a:rPr lang="en-US"/>
               <a:t>Third level</a:t>
             </a:r>
           </a:p>
           <a:p>
             <a:pPr lvl="3"/>
             <a:r>
-              <a:rPr lang="en-US" smtClean="0"/>
+              <a:rPr lang="en-US"/>
               <a:t>Fourth level</a:t>
             </a:r>
           </a:p>
           <a:p>
             <a:pPr lvl="4"/>
             <a:r>
-              <a:rPr lang="en-US" smtClean="0"/>
+              <a:rPr lang="en-US"/>
               <a:t>Fifth level</a:t>
             </a:r>
             <a:endParaRPr lang="en-US" dirty="0"/>
@@ -5321,7 +5321,7 @@
           <a:p>
             <a:fld id="{F25FC3B1-12D0-4CE0-A1B2-F5FC9898A908}" type="datetimeFigureOut">
               <a:rPr lang="en-US" smtClean="0"/>
-              <a:t>6/12/2019</a:t>
+              <a:t>6/14/2019</a:t>
             </a:fld>
             <a:endParaRPr lang="en-US"/>
           </a:p>
@@ -5855,18 +5855,17 @@
           <a:lstStyle/>
           <a:p>
             <a:r>
-              <a:rPr lang="en-US" dirty="0" smtClean="0"/>
+              <a:rPr lang="en-US" dirty="0"/>
               <a:t>What can </a:t>
             </a:r>
             <a:r>
-              <a:rPr lang="en-US" dirty="0" err="1" smtClean="0"/>
+              <a:rPr lang="en-US" dirty="0" err="1"/>
               <a:t>redis</a:t>
             </a:r>
             <a:r>
-              <a:rPr lang="en-US" dirty="0" smtClean="0"/>
+              <a:rPr lang="en-US" dirty="0"/>
               <a:t> do for you?</a:t>
             </a:r>
-            <a:endParaRPr lang="en-US" dirty="0"/>
           </a:p>
         </p:txBody>
       </p:sp>
@@ -5886,11 +5885,11 @@
           <a:lstStyle/>
           <a:p>
             <a:r>
-              <a:rPr lang="en-US" dirty="0" smtClean="0"/>
+              <a:rPr lang="en-US" dirty="0"/>
               <a:t>An intro to </a:t>
             </a:r>
             <a:r>
-              <a:rPr lang="en-US" dirty="0" err="1" smtClean="0"/>
+              <a:rPr lang="en-US" dirty="0" err="1"/>
               <a:t>redis</a:t>
             </a:r>
             <a:endParaRPr lang="en-US" dirty="0"/>
@@ -5943,18 +5942,17 @@
           <a:lstStyle/>
           <a:p>
             <a:r>
-              <a:rPr lang="en-US" dirty="0" smtClean="0"/>
+              <a:rPr lang="en-US" dirty="0"/>
               <a:t>What is </a:t>
             </a:r>
             <a:r>
-              <a:rPr lang="en-US" dirty="0" err="1" smtClean="0"/>
+              <a:rPr lang="en-US" dirty="0" err="1"/>
               <a:t>redis</a:t>
             </a:r>
             <a:r>
-              <a:rPr lang="en-US" dirty="0" smtClean="0"/>
+              <a:rPr lang="en-US" dirty="0"/>
               <a:t>?</a:t>
             </a:r>
-            <a:endParaRPr lang="en-US" dirty="0"/>
           </a:p>
         </p:txBody>
       </p:sp>
@@ -5976,46 +5974,33 @@
           <a:lstStyle/>
           <a:p>
             <a:r>
-              <a:rPr lang="en-US" sz="2000" dirty="0" smtClean="0"/>
-              <a:t>A </a:t>
-            </a:r>
-            <a:r>
-              <a:rPr lang="en-US" sz="2000" dirty="0" smtClean="0"/>
-              <a:t>very fast</a:t>
-            </a:r>
-            <a:r>
-              <a:rPr lang="en-US" sz="2000" dirty="0" smtClean="0"/>
-              <a:t> </a:t>
-            </a:r>
-            <a:r>
-              <a:rPr lang="en-US" sz="2000" dirty="0" smtClean="0"/>
-              <a:t>in-memory data structure store</a:t>
-            </a:r>
-          </a:p>
-          <a:p>
-            <a:r>
-              <a:rPr lang="en-US" sz="2000" dirty="0" smtClean="0"/>
+              <a:rPr lang="en-US" sz="2000" dirty="0"/>
+              <a:t>A very fast in-memory data structure store</a:t>
+            </a:r>
+          </a:p>
+          <a:p>
+            <a:r>
+              <a:rPr lang="en-US" sz="2000" dirty="0"/>
               <a:t>Used as a database, cache, or message broker</a:t>
             </a:r>
           </a:p>
           <a:p>
             <a:r>
-              <a:rPr lang="en-US" sz="2000" dirty="0" smtClean="0"/>
+              <a:rPr lang="en-US" sz="2000" dirty="0"/>
               <a:t>Essentially a very fast key-value store</a:t>
             </a:r>
           </a:p>
           <a:p>
             <a:r>
-              <a:rPr lang="en-US" sz="2000" dirty="0" smtClean="0"/>
+              <a:rPr lang="en-US" sz="2000" dirty="0"/>
               <a:t>Supported in most widely-used languages (C, C#, C++, Java, Python, Node.js, Scala, etc.)</a:t>
             </a:r>
           </a:p>
           <a:p>
             <a:r>
-              <a:rPr lang="en-US" sz="2000" dirty="0" smtClean="0"/>
+              <a:rPr lang="en-US" sz="2000" dirty="0"/>
               <a:t>Supports many basic types and sets as values</a:t>
             </a:r>
-            <a:endParaRPr lang="en-US" sz="2000" dirty="0"/>
           </a:p>
         </p:txBody>
       </p:sp>
@@ -6065,10 +6050,9 @@
           <a:lstStyle/>
           <a:p>
             <a:r>
-              <a:rPr lang="en-US" dirty="0" smtClean="0"/>
+              <a:rPr lang="en-US" dirty="0"/>
               <a:t>Why do I care?</a:t>
             </a:r>
-            <a:endParaRPr lang="en-US" dirty="0"/>
           </a:p>
         </p:txBody>
       </p:sp>
@@ -6090,45 +6074,51 @@
           <a:lstStyle/>
           <a:p>
             <a:r>
-              <a:rPr lang="en-US" sz="2000" dirty="0" smtClean="0"/>
+              <a:rPr lang="en-US" sz="2000" dirty="0"/>
               <a:t>Caching of queries</a:t>
             </a:r>
           </a:p>
           <a:p>
             <a:r>
-              <a:rPr lang="en-US" sz="2000" dirty="0" smtClean="0"/>
+              <a:rPr lang="en-US" sz="2000" dirty="0"/>
               <a:t>Performance improvements</a:t>
             </a:r>
           </a:p>
           <a:p>
             <a:pPr lvl="1"/>
             <a:r>
-              <a:rPr lang="en-US" sz="2000" dirty="0" smtClean="0"/>
-              <a:t>5-10x </a:t>
-            </a:r>
-            <a:r>
-              <a:rPr lang="en-US" sz="2000" dirty="0" smtClean="0"/>
-              <a:t>Faster </a:t>
-            </a:r>
-            <a:r>
-              <a:rPr lang="en-US" sz="2000" dirty="0" err="1" smtClean="0"/>
+              <a:rPr lang="en-US" sz="2000" dirty="0"/>
+              <a:t>5-10x Faster </a:t>
+            </a:r>
+            <a:r>
+              <a:rPr lang="en-US" sz="2000" dirty="0" err="1"/>
               <a:t>GraphQL</a:t>
             </a:r>
             <a:r>
-              <a:rPr lang="en-US" sz="2000" dirty="0" smtClean="0"/>
+              <a:rPr lang="en-US" sz="2000" dirty="0"/>
               <a:t> queries</a:t>
             </a:r>
           </a:p>
           <a:p>
             <a:r>
-              <a:rPr lang="en-US" sz="2000" dirty="0" smtClean="0"/>
+              <a:rPr lang="en-US" sz="2000" dirty="0"/>
               <a:t>One server/cluster can cache multiple types of information</a:t>
             </a:r>
           </a:p>
           <a:p>
             <a:r>
-              <a:rPr lang="en-US" sz="2000" dirty="0" smtClean="0"/>
+              <a:rPr lang="en-US" sz="2000" dirty="0"/>
               <a:t>Easy to use</a:t>
+            </a:r>
+          </a:p>
+          <a:p>
+            <a:r>
+              <a:rPr lang="en-US" sz="2000" dirty="0"/>
+              <a:t>Can theoretically store anything, not just </a:t>
+            </a:r>
+            <a:r>
+              <a:rPr lang="en-US" sz="2000"/>
+              <a:t>query results</a:t>
             </a:r>
             <a:endParaRPr lang="en-US" sz="2000" dirty="0"/>
           </a:p>
@@ -6180,10 +6170,9 @@
           <a:lstStyle/>
           <a:p>
             <a:r>
-              <a:rPr lang="en-US" dirty="0" smtClean="0"/>
+              <a:rPr lang="en-US" dirty="0"/>
               <a:t>Limitations</a:t>
             </a:r>
-            <a:endParaRPr lang="en-US" dirty="0"/>
           </a:p>
         </p:txBody>
       </p:sp>
@@ -6205,37 +6194,32 @@
           <a:lstStyle/>
           <a:p>
             <a:r>
-              <a:rPr lang="en-US" sz="2000" dirty="0" smtClean="0"/>
-              <a:t>Larger keys = Larger lookup </a:t>
-            </a:r>
-            <a:r>
-              <a:rPr lang="en-US" sz="2000" dirty="0" smtClean="0"/>
-              <a:t>times</a:t>
-            </a:r>
-            <a:endParaRPr lang="en-US" sz="2000" dirty="0" smtClean="0"/>
-          </a:p>
-          <a:p>
-            <a:r>
-              <a:rPr lang="en-US" sz="2000" dirty="0" smtClean="0"/>
-              <a:t>Memory-intensive: All data held in memory</a:t>
-            </a:r>
-          </a:p>
-          <a:p>
-            <a:r>
-              <a:rPr lang="en-US" sz="2000" dirty="0" smtClean="0"/>
+              <a:rPr lang="en-US" sz="2000" dirty="0"/>
+              <a:t>Larger keys = Larger lookup times</a:t>
+            </a:r>
+          </a:p>
+          <a:p>
+            <a:r>
+              <a:rPr lang="en-US" sz="2000" dirty="0"/>
+              <a:t>Memory-intensive on the server: All data held in memory</a:t>
+            </a:r>
+          </a:p>
+          <a:p>
+            <a:r>
+              <a:rPr lang="en-US" sz="2000" dirty="0"/>
               <a:t>Keys must be strings or binary sequences</a:t>
             </a:r>
-            <a:endParaRPr lang="en-US" sz="1800" dirty="0" smtClean="0"/>
-          </a:p>
-          <a:p>
-            <a:r>
-              <a:rPr lang="en-US" sz="2000" dirty="0" smtClean="0"/>
-              <a:t>Keys and values are limited to 512MB</a:t>
-            </a:r>
-          </a:p>
-          <a:p>
-            <a:r>
-              <a:rPr lang="en-US" sz="2000" dirty="0" smtClean="0"/>
+            <a:endParaRPr lang="en-US" sz="1800" dirty="0"/>
+          </a:p>
+          <a:p>
+            <a:r>
+              <a:rPr lang="en-US" sz="2000" dirty="0"/>
+              <a:t>Keys and values are limited to 512MB each </a:t>
+            </a:r>
+          </a:p>
+          <a:p>
+            <a:r>
+              <a:rPr lang="en-US" sz="2000" dirty="0"/>
               <a:t>Less persistence than fully-fledged RDBMS</a:t>
             </a:r>
           </a:p>
@@ -6287,10 +6271,9 @@
           <a:lstStyle/>
           <a:p>
             <a:r>
-              <a:rPr lang="en-US" dirty="0" smtClean="0"/>
+              <a:rPr lang="en-US" dirty="0"/>
               <a:t>How do I use it?</a:t>
             </a:r>
-            <a:endParaRPr lang="en-US" dirty="0"/>
           </a:p>
         </p:txBody>
       </p:sp>
@@ -6312,38 +6295,44 @@
           <a:lstStyle/>
           <a:p>
             <a:r>
-              <a:rPr lang="en-US" sz="2000" dirty="0" smtClean="0"/>
+              <a:rPr lang="en-US" sz="2000" dirty="0"/>
               <a:t>Essentially a giant </a:t>
             </a:r>
             <a:r>
-              <a:rPr lang="en-US" sz="2000" dirty="0" err="1" smtClean="0"/>
+              <a:rPr lang="en-US" sz="2000" dirty="0" err="1"/>
               <a:t>HashMap</a:t>
             </a:r>
-            <a:endParaRPr lang="en-US" sz="2000" dirty="0" smtClean="0"/>
+            <a:endParaRPr lang="en-US" sz="2000" dirty="0"/>
           </a:p>
           <a:p>
             <a:pPr lvl="1"/>
             <a:r>
-              <a:rPr lang="en-US" sz="2000" dirty="0" smtClean="0"/>
+              <a:rPr lang="en-US" sz="2000" dirty="0"/>
               <a:t>Insert, remove, edit key-value pairs</a:t>
             </a:r>
           </a:p>
           <a:p>
             <a:r>
-              <a:rPr lang="en-US" sz="2000" dirty="0" smtClean="0"/>
+              <a:rPr lang="en-US" sz="2000" dirty="0"/>
               <a:t>Clients offer easy API methods</a:t>
             </a:r>
           </a:p>
           <a:p>
             <a:r>
-              <a:rPr lang="en-US" sz="2000" dirty="0" smtClean="0"/>
+              <a:rPr lang="en-US" sz="2000" dirty="0"/>
               <a:t>Most methods can be asynchronous or synchronous </a:t>
             </a:r>
           </a:p>
           <a:p>
             <a:r>
-              <a:rPr lang="en-US" sz="2000" dirty="0" smtClean="0"/>
+              <a:rPr lang="en-US" sz="2000" dirty="0"/>
               <a:t>Use query as key, string representation of result as value</a:t>
+            </a:r>
+          </a:p>
+          <a:p>
+            <a:r>
+              <a:rPr lang="en-US" sz="2000" dirty="0"/>
+              <a:t>Note: Can use Redis Explorer extension for Visual Studio if you want a GUI</a:t>
             </a:r>
           </a:p>
           <a:p>
@@ -6377,7 +6366,7 @@
               <a:buNone/>
             </a:pPr>
             <a:r>
-              <a:rPr lang="en-US" dirty="0" smtClean="0">
+              <a:rPr lang="en-US" dirty="0">
                 <a:latin typeface="Lucida Sans Typewriter" panose="020B0509030504030204" pitchFamily="49" charset="0"/>
               </a:rPr>
               <a:t>// C# example code</a:t>
@@ -6388,30 +6377,30 @@
               <a:buNone/>
             </a:pPr>
             <a:r>
-              <a:rPr lang="en-US" dirty="0" smtClean="0">
+              <a:rPr lang="en-US" dirty="0">
                 <a:latin typeface="Lucida Sans Typewriter" panose="020B0509030504030204" pitchFamily="49" charset="0"/>
               </a:rPr>
               <a:t>// </a:t>
             </a:r>
             <a:r>
-              <a:rPr lang="en-US" dirty="0" err="1" smtClean="0">
+              <a:rPr lang="en-US" dirty="0" err="1">
                 <a:latin typeface="Lucida Sans Typewriter" panose="020B0509030504030204" pitchFamily="49" charset="0"/>
               </a:rPr>
               <a:t>db</a:t>
             </a:r>
             <a:r>
-              <a:rPr lang="en-US" dirty="0" smtClean="0">
+              <a:rPr lang="en-US" dirty="0">
                 <a:latin typeface="Lucida Sans Typewriter" panose="020B0509030504030204" pitchFamily="49" charset="0"/>
               </a:rPr>
               <a:t> is connection to </a:t>
             </a:r>
             <a:r>
-              <a:rPr lang="en-US" dirty="0" err="1" smtClean="0">
+              <a:rPr lang="en-US" dirty="0" err="1">
                 <a:latin typeface="Lucida Sans Typewriter" panose="020B0509030504030204" pitchFamily="49" charset="0"/>
               </a:rPr>
               <a:t>Redis</a:t>
             </a:r>
-            <a:endParaRPr lang="en-US" dirty="0" smtClean="0">
+            <a:endParaRPr lang="en-US" dirty="0">
               <a:latin typeface="Lucida Sans Typewriter" panose="020B0509030504030204" pitchFamily="49" charset="0"/>
             </a:endParaRPr>
           </a:p>
@@ -6420,7 +6409,7 @@
               <a:buNone/>
             </a:pPr>
             <a:r>
-              <a:rPr lang="en-US" dirty="0" smtClean="0">
+              <a:rPr lang="en-US" dirty="0">
                 <a:latin typeface="Lucida Sans Typewriter" panose="020B0509030504030204" pitchFamily="49" charset="0"/>
               </a:rPr>
               <a:t>string key = “Any string”;</a:t>
@@ -6431,7 +6420,7 @@
               <a:buNone/>
             </a:pPr>
             <a:r>
-              <a:rPr lang="en-US" dirty="0" smtClean="0">
+              <a:rPr lang="en-US" dirty="0">
                 <a:latin typeface="Lucida Sans Typewriter" panose="020B0509030504030204" pitchFamily="49" charset="0"/>
               </a:rPr>
               <a:t>string value = “Basic data type or set”;</a:t>
@@ -6442,13 +6431,13 @@
               <a:buNone/>
             </a:pPr>
             <a:r>
-              <a:rPr lang="en-US" dirty="0" err="1" smtClean="0">
+              <a:rPr lang="en-US" dirty="0" err="1">
                 <a:latin typeface="Lucida Sans Typewriter" panose="020B0509030504030204" pitchFamily="49" charset="0"/>
               </a:rPr>
               <a:t>db.StringSet</a:t>
             </a:r>
             <a:r>
-              <a:rPr lang="en-US" dirty="0" smtClean="0">
+              <a:rPr lang="en-US" dirty="0">
                 <a:latin typeface="Lucida Sans Typewriter" panose="020B0509030504030204" pitchFamily="49" charset="0"/>
               </a:rPr>
               <a:t>(key, value);</a:t>
@@ -6459,31 +6448,31 @@
               <a:buNone/>
             </a:pPr>
             <a:r>
-              <a:rPr lang="en-US" dirty="0" smtClean="0">
+              <a:rPr lang="en-US" dirty="0">
                 <a:latin typeface="Lucida Sans Typewriter" panose="020B0509030504030204" pitchFamily="49" charset="0"/>
               </a:rPr>
               <a:t>string </a:t>
             </a:r>
             <a:r>
-              <a:rPr lang="en-US" dirty="0" err="1" smtClean="0">
+              <a:rPr lang="en-US" dirty="0" err="1">
                 <a:latin typeface="Lucida Sans Typewriter" panose="020B0509030504030204" pitchFamily="49" charset="0"/>
               </a:rPr>
               <a:t>retVal</a:t>
             </a:r>
             <a:r>
-              <a:rPr lang="en-US" dirty="0" smtClean="0">
+              <a:rPr lang="en-US" dirty="0">
                 <a:latin typeface="Lucida Sans Typewriter" panose="020B0509030504030204" pitchFamily="49" charset="0"/>
               </a:rPr>
               <a:t> = </a:t>
             </a:r>
             <a:r>
-              <a:rPr lang="en-US" dirty="0" err="1" smtClean="0">
+              <a:rPr lang="en-US" dirty="0" err="1">
                 <a:latin typeface="Lucida Sans Typewriter" panose="020B0509030504030204" pitchFamily="49" charset="0"/>
               </a:rPr>
               <a:t>db.StringGet</a:t>
             </a:r>
             <a:r>
-              <a:rPr lang="en-US" dirty="0" smtClean="0">
+              <a:rPr lang="en-US" dirty="0">
                 <a:latin typeface="Lucida Sans Typewriter" panose="020B0509030504030204" pitchFamily="49" charset="0"/>
               </a:rPr>
               <a:t>(key);</a:t>
@@ -6494,31 +6483,31 @@
               <a:buNone/>
             </a:pPr>
             <a:r>
-              <a:rPr lang="en-US" dirty="0" smtClean="0">
+              <a:rPr lang="en-US" dirty="0">
                 <a:latin typeface="Lucida Sans Typewriter" panose="020B0509030504030204" pitchFamily="49" charset="0"/>
               </a:rPr>
               <a:t>bool </a:t>
             </a:r>
             <a:r>
-              <a:rPr lang="en-US" dirty="0" err="1" smtClean="0">
+              <a:rPr lang="en-US" dirty="0" err="1">
                 <a:latin typeface="Lucida Sans Typewriter" panose="020B0509030504030204" pitchFamily="49" charset="0"/>
               </a:rPr>
               <a:t>isSame</a:t>
             </a:r>
             <a:r>
-              <a:rPr lang="en-US" dirty="0" smtClean="0">
+              <a:rPr lang="en-US" dirty="0">
                 <a:latin typeface="Lucida Sans Typewriter" panose="020B0509030504030204" pitchFamily="49" charset="0"/>
               </a:rPr>
               <a:t> = </a:t>
             </a:r>
             <a:r>
-              <a:rPr lang="en-US" dirty="0" err="1" smtClean="0">
+              <a:rPr lang="en-US" dirty="0" err="1">
                 <a:latin typeface="Lucida Sans Typewriter" panose="020B0509030504030204" pitchFamily="49" charset="0"/>
               </a:rPr>
               <a:t>retVal.Equals</a:t>
             </a:r>
             <a:r>
-              <a:rPr lang="en-US" dirty="0" smtClean="0">
+              <a:rPr lang="en-US" dirty="0">
                 <a:latin typeface="Lucida Sans Typewriter" panose="020B0509030504030204" pitchFamily="49" charset="0"/>
               </a:rPr>
               <a:t>(value); // True</a:t>
@@ -6580,11 +6569,11 @@
           <a:lstStyle/>
           <a:p>
             <a:r>
-              <a:rPr lang="en-US" dirty="0" smtClean="0"/>
+              <a:rPr lang="en-US" dirty="0"/>
               <a:t>When to not use </a:t>
             </a:r>
             <a:r>
-              <a:rPr lang="en-US" dirty="0" err="1" smtClean="0"/>
+              <a:rPr lang="en-US" dirty="0" err="1"/>
               <a:t>Redis</a:t>
             </a:r>
             <a:endParaRPr lang="en-US" dirty="0"/>
@@ -6609,72 +6598,43 @@
           <a:lstStyle/>
           <a:p>
             <a:r>
-              <a:rPr lang="en-US" sz="2000" dirty="0" smtClean="0"/>
+              <a:rPr lang="en-US" sz="2000" dirty="0"/>
               <a:t>Very large queries</a:t>
             </a:r>
           </a:p>
           <a:p>
             <a:pPr lvl="1"/>
             <a:r>
-              <a:rPr lang="en-US" sz="1800" dirty="0" smtClean="0"/>
-              <a:t>Major l</a:t>
-            </a:r>
-            <a:r>
-              <a:rPr lang="en-US" sz="1800" dirty="0" smtClean="0"/>
-              <a:t>imiting </a:t>
-            </a:r>
-            <a:r>
-              <a:rPr lang="en-US" sz="1800" dirty="0" smtClean="0"/>
-              <a:t>factor will be network bandwidth/latency</a:t>
-            </a:r>
-          </a:p>
-          <a:p>
-            <a:r>
-              <a:rPr lang="en-US" sz="2000" dirty="0" smtClean="0"/>
-              <a:t>SQL Server Queries</a:t>
+              <a:rPr lang="en-US" sz="1800" dirty="0"/>
+              <a:t>Major limiting factor will be network bandwidth/latency</a:t>
+            </a:r>
+          </a:p>
+          <a:p>
+            <a:r>
+              <a:rPr lang="en-US" sz="2000" dirty="0"/>
+              <a:t>SQL Server Queries (Specifically the results)</a:t>
             </a:r>
           </a:p>
           <a:p>
             <a:pPr lvl="1"/>
             <a:r>
-              <a:rPr lang="en-US" sz="1800" dirty="0" smtClean="0"/>
+              <a:rPr lang="en-US" sz="1800" dirty="0"/>
               <a:t>Cost of parsing into compatible format is very high</a:t>
             </a:r>
           </a:p>
           <a:p>
             <a:pPr lvl="1"/>
             <a:r>
-              <a:rPr lang="en-US" sz="1800" dirty="0" smtClean="0"/>
-              <a:t>SQL Server 2016 </a:t>
-            </a:r>
-            <a:r>
-              <a:rPr lang="en-US" sz="1800" dirty="0" smtClean="0"/>
-              <a:t>supports </a:t>
-            </a:r>
-            <a:r>
-              <a:rPr lang="en-US" sz="1800" dirty="0" smtClean="0"/>
-              <a:t>JSON return, we don’t have </a:t>
-            </a:r>
-            <a:r>
-              <a:rPr lang="en-US" sz="1800" dirty="0" smtClean="0"/>
-              <a:t>that</a:t>
+              <a:rPr lang="en-US" sz="1800" dirty="0"/>
+              <a:t>SQL Server 2016 supports JSON return, we don’t have that</a:t>
             </a:r>
           </a:p>
           <a:p>
             <a:pPr lvl="1"/>
             <a:r>
-              <a:rPr lang="en-US" sz="1800" dirty="0" err="1" smtClean="0"/>
-              <a:t>Redis</a:t>
-            </a:r>
-            <a:r>
-              <a:rPr lang="en-US" sz="1800" dirty="0" smtClean="0"/>
-              <a:t> performs at about the </a:t>
-            </a:r>
-            <a:r>
-              <a:rPr lang="en-US" sz="1800" smtClean="0"/>
-              <a:t>same speed</a:t>
-            </a:r>
-            <a:endParaRPr lang="en-US" sz="1800" dirty="0" smtClean="0"/>
+              <a:rPr lang="en-US" sz="1800" dirty="0"/>
+              <a:t>Redis performs at about the same speed</a:t>
+            </a:r>
           </a:p>
         </p:txBody>
       </p:sp>
@@ -6724,10 +6684,9 @@
           <a:lstStyle/>
           <a:p>
             <a:r>
-              <a:rPr lang="en-US" dirty="0" smtClean="0"/>
+              <a:rPr lang="en-US" dirty="0"/>
               <a:t>Cloning the repo	</a:t>
             </a:r>
-            <a:endParaRPr lang="en-US" dirty="0"/>
           </a:p>
         </p:txBody>
       </p:sp>
@@ -6749,25 +6708,25 @@
           <a:lstStyle/>
           <a:p>
             <a:r>
-              <a:rPr lang="en-US" sz="2000" dirty="0" smtClean="0"/>
+              <a:rPr lang="en-US" sz="2000" dirty="0"/>
               <a:t>We have provided some starter code</a:t>
             </a:r>
           </a:p>
           <a:p>
             <a:r>
-              <a:rPr lang="en-US" sz="2000" dirty="0" err="1" smtClean="0">
+              <a:rPr lang="en-US" sz="2000" dirty="0" err="1">
                 <a:latin typeface="Lucida Sans Typewriter" panose="020B0509030504030204" pitchFamily="49" charset="0"/>
               </a:rPr>
               <a:t>git</a:t>
             </a:r>
             <a:r>
-              <a:rPr lang="en-US" sz="2000" dirty="0" smtClean="0">
+              <a:rPr lang="en-US" sz="2000" dirty="0">
                 <a:latin typeface="Lucida Sans Typewriter" panose="020B0509030504030204" pitchFamily="49" charset="0"/>
               </a:rPr>
               <a:t> clone https://github.com/zoldham/Redis-Intro </a:t>
             </a:r>
             <a:r>
-              <a:rPr lang="en-US" sz="2000" dirty="0" err="1" smtClean="0">
+              <a:rPr lang="en-US" sz="2000" dirty="0" err="1">
                 <a:latin typeface="Lucida Sans Typewriter" panose="020B0509030504030204" pitchFamily="49" charset="0"/>
               </a:rPr>
               <a:t>Redis</a:t>
@@ -6778,18 +6737,17 @@
           </a:p>
           <a:p>
             <a:r>
-              <a:rPr lang="en-US" sz="2000" dirty="0" smtClean="0"/>
+              <a:rPr lang="en-US" sz="2000" dirty="0"/>
               <a:t> The starter code will be in </a:t>
             </a:r>
             <a:r>
-              <a:rPr lang="en-US" sz="2000" dirty="0" err="1" smtClean="0"/>
+              <a:rPr lang="en-US" sz="2000" dirty="0" err="1"/>
               <a:t>Redis</a:t>
             </a:r>
             <a:r>
-              <a:rPr lang="en-US" sz="2000" dirty="0" smtClean="0"/>
+              <a:rPr lang="en-US" sz="2000" dirty="0"/>
               <a:t>/Attendees</a:t>
             </a:r>
-            <a:endParaRPr lang="en-US" sz="2000" dirty="0"/>
           </a:p>
         </p:txBody>
       </p:sp>

</xml_diff>

<commit_message>
Added clarification on using SQL Server w/ redis
</commit_message>
<xml_diff>
--- a/Presenters/Presentation.pptx
+++ b/Presenters/Presentation.pptx
@@ -348,7 +348,7 @@
           <a:p>
             <a:fld id="{F25FC3B1-12D0-4CE0-A1B2-F5FC9898A908}" type="datetimeFigureOut">
               <a:rPr lang="en-US" smtClean="0"/>
-              <a:t>6/17/2019</a:t>
+              <a:t>6/21/2019</a:t>
             </a:fld>
             <a:endParaRPr lang="en-US"/>
           </a:p>
@@ -682,7 +682,7 @@
           <a:p>
             <a:fld id="{F25FC3B1-12D0-4CE0-A1B2-F5FC9898A908}" type="datetimeFigureOut">
               <a:rPr lang="en-US" smtClean="0"/>
-              <a:t>6/17/2019</a:t>
+              <a:t>6/21/2019</a:t>
             </a:fld>
             <a:endParaRPr lang="en-US"/>
           </a:p>
@@ -960,7 +960,7 @@
           <a:p>
             <a:fld id="{F25FC3B1-12D0-4CE0-A1B2-F5FC9898A908}" type="datetimeFigureOut">
               <a:rPr lang="en-US" smtClean="0"/>
-              <a:t>6/17/2019</a:t>
+              <a:t>6/21/2019</a:t>
             </a:fld>
             <a:endParaRPr lang="en-US"/>
           </a:p>
@@ -1528,7 +1528,7 @@
           <a:p>
             <a:fld id="{F25FC3B1-12D0-4CE0-A1B2-F5FC9898A908}" type="datetimeFigureOut">
               <a:rPr lang="en-US" smtClean="0"/>
-              <a:t>6/17/2019</a:t>
+              <a:t>6/21/2019</a:t>
             </a:fld>
             <a:endParaRPr lang="en-US"/>
           </a:p>
@@ -1806,7 +1806,7 @@
           <a:p>
             <a:fld id="{F25FC3B1-12D0-4CE0-A1B2-F5FC9898A908}" type="datetimeFigureOut">
               <a:rPr lang="en-US" smtClean="0"/>
-              <a:t>6/17/2019</a:t>
+              <a:t>6/21/2019</a:t>
             </a:fld>
             <a:endParaRPr lang="en-US"/>
           </a:p>
@@ -2368,7 +2368,7 @@
           <a:p>
             <a:fld id="{F25FC3B1-12D0-4CE0-A1B2-F5FC9898A908}" type="datetimeFigureOut">
               <a:rPr lang="en-US" smtClean="0"/>
-              <a:t>6/17/2019</a:t>
+              <a:t>6/21/2019</a:t>
             </a:fld>
             <a:endParaRPr lang="en-US"/>
           </a:p>
@@ -2695,7 +2695,7 @@
           <a:p>
             <a:fld id="{F25FC3B1-12D0-4CE0-A1B2-F5FC9898A908}" type="datetimeFigureOut">
               <a:rPr lang="en-US" smtClean="0"/>
-              <a:t>6/17/2019</a:t>
+              <a:t>6/21/2019</a:t>
             </a:fld>
             <a:endParaRPr lang="en-US"/>
           </a:p>
@@ -2872,7 +2872,7 @@
           <a:p>
             <a:fld id="{F25FC3B1-12D0-4CE0-A1B2-F5FC9898A908}" type="datetimeFigureOut">
               <a:rPr lang="en-US" smtClean="0"/>
-              <a:t>6/17/2019</a:t>
+              <a:t>6/21/2019</a:t>
             </a:fld>
             <a:endParaRPr lang="en-US"/>
           </a:p>
@@ -3110,7 +3110,7 @@
           <a:p>
             <a:fld id="{F25FC3B1-12D0-4CE0-A1B2-F5FC9898A908}" type="datetimeFigureOut">
               <a:rPr lang="en-US" smtClean="0"/>
-              <a:t>6/17/2019</a:t>
+              <a:t>6/21/2019</a:t>
             </a:fld>
             <a:endParaRPr lang="en-US"/>
           </a:p>
@@ -3310,7 +3310,7 @@
           <a:p>
             <a:fld id="{F25FC3B1-12D0-4CE0-A1B2-F5FC9898A908}" type="datetimeFigureOut">
               <a:rPr lang="en-US" smtClean="0"/>
-              <a:t>6/17/2019</a:t>
+              <a:t>6/21/2019</a:t>
             </a:fld>
             <a:endParaRPr lang="en-US"/>
           </a:p>
@@ -3586,7 +3586,7 @@
           <a:p>
             <a:fld id="{F25FC3B1-12D0-4CE0-A1B2-F5FC9898A908}" type="datetimeFigureOut">
               <a:rPr lang="en-US" smtClean="0"/>
-              <a:t>6/17/2019</a:t>
+              <a:t>6/21/2019</a:t>
             </a:fld>
             <a:endParaRPr lang="en-US"/>
           </a:p>
@@ -3852,7 +3852,7 @@
           <a:p>
             <a:fld id="{F25FC3B1-12D0-4CE0-A1B2-F5FC9898A908}" type="datetimeFigureOut">
               <a:rPr lang="en-US" smtClean="0"/>
-              <a:t>6/17/2019</a:t>
+              <a:t>6/21/2019</a:t>
             </a:fld>
             <a:endParaRPr lang="en-US"/>
           </a:p>
@@ -4226,7 +4226,7 @@
           <a:p>
             <a:fld id="{F25FC3B1-12D0-4CE0-A1B2-F5FC9898A908}" type="datetimeFigureOut">
               <a:rPr lang="en-US" smtClean="0"/>
-              <a:t>6/17/2019</a:t>
+              <a:t>6/21/2019</a:t>
             </a:fld>
             <a:endParaRPr lang="en-US"/>
           </a:p>
@@ -4374,7 +4374,7 @@
           <a:p>
             <a:fld id="{F25FC3B1-12D0-4CE0-A1B2-F5FC9898A908}" type="datetimeFigureOut">
               <a:rPr lang="en-US" smtClean="0"/>
-              <a:t>6/17/2019</a:t>
+              <a:t>6/21/2019</a:t>
             </a:fld>
             <a:endParaRPr lang="en-US"/>
           </a:p>
@@ -4499,7 +4499,7 @@
           <a:p>
             <a:fld id="{F25FC3B1-12D0-4CE0-A1B2-F5FC9898A908}" type="datetimeFigureOut">
               <a:rPr lang="en-US" smtClean="0"/>
-              <a:t>6/17/2019</a:t>
+              <a:t>6/21/2019</a:t>
             </a:fld>
             <a:endParaRPr lang="en-US"/>
           </a:p>
@@ -4784,7 +4784,7 @@
           <a:p>
             <a:fld id="{F25FC3B1-12D0-4CE0-A1B2-F5FC9898A908}" type="datetimeFigureOut">
               <a:rPr lang="en-US" smtClean="0"/>
-              <a:t>6/17/2019</a:t>
+              <a:t>6/21/2019</a:t>
             </a:fld>
             <a:endParaRPr lang="en-US"/>
           </a:p>
@@ -5108,7 +5108,7 @@
           <a:p>
             <a:fld id="{F25FC3B1-12D0-4CE0-A1B2-F5FC9898A908}" type="datetimeFigureOut">
               <a:rPr lang="en-US" smtClean="0"/>
-              <a:t>6/17/2019</a:t>
+              <a:t>6/21/2019</a:t>
             </a:fld>
             <a:endParaRPr lang="en-US"/>
           </a:p>
@@ -5322,7 +5322,7 @@
           <a:p>
             <a:fld id="{F25FC3B1-12D0-4CE0-A1B2-F5FC9898A908}" type="datetimeFigureOut">
               <a:rPr lang="en-US" smtClean="0"/>
-              <a:t>6/17/2019</a:t>
+              <a:t>6/21/2019</a:t>
             </a:fld>
             <a:endParaRPr lang="en-US"/>
           </a:p>
@@ -6804,7 +6804,7 @@
           <a:p>
             <a:r>
               <a:rPr lang="en-US" sz="2000" dirty="0"/>
-              <a:t>SQL Server Queries (Specifically the results)</a:t>
+              <a:t>SQL Server Queries (Specifically the results) for performance improvements</a:t>
             </a:r>
           </a:p>
           <a:p>
@@ -6826,6 +6826,13 @@
             <a:r>
               <a:rPr lang="en-US" sz="2000" dirty="0"/>
               <a:t>Redis performs at about the same speed</a:t>
+            </a:r>
+          </a:p>
+          <a:p>
+            <a:pPr lvl="1"/>
+            <a:r>
+              <a:rPr lang="en-US" sz="2000" dirty="0"/>
+              <a:t>Only reason would be to remove load from SQL Server</a:t>
             </a:r>
           </a:p>
         </p:txBody>

</xml_diff>